<commit_message>
Last commit, don't know what is implemented.
</commit_message>
<xml_diff>
--- a/MiningTown/Assets/Textures/TexturesIcons.pptx
+++ b/MiningTown/Assets/Textures/TexturesIcons.pptx
@@ -6,6 +6,8 @@
   </p:sldMasterIdLst>
   <p:sldIdLst>
     <p:sldId id="256" r:id="rId2"/>
+    <p:sldId id="257" r:id="rId3"/>
+    <p:sldId id="258" r:id="rId4"/>
   </p:sldIdLst>
   <p:sldSz cx="9144000" cy="6858000" type="screen4x3"/>
   <p:notesSz cx="6858000" cy="9144000"/>
@@ -289,7 +291,7 @@
             <a:fld id="{1D8BD707-D9CF-40AE-B4C6-C98DA3205C09}" type="datetimeFigureOut">
               <a:rPr lang="en-US" smtClean="0"/>
               <a:pPr/>
-              <a:t>22-Jan-20</a:t>
+              <a:t>24-Jan-20</a:t>
             </a:fld>
             <a:endParaRPr lang="en-US"/>
           </a:p>
@@ -456,7 +458,7 @@
             <a:fld id="{1D8BD707-D9CF-40AE-B4C6-C98DA3205C09}" type="datetimeFigureOut">
               <a:rPr lang="en-US" smtClean="0"/>
               <a:pPr/>
-              <a:t>22-Jan-20</a:t>
+              <a:t>24-Jan-20</a:t>
             </a:fld>
             <a:endParaRPr lang="en-US"/>
           </a:p>
@@ -633,7 +635,7 @@
             <a:fld id="{1D8BD707-D9CF-40AE-B4C6-C98DA3205C09}" type="datetimeFigureOut">
               <a:rPr lang="en-US" smtClean="0"/>
               <a:pPr/>
-              <a:t>22-Jan-20</a:t>
+              <a:t>24-Jan-20</a:t>
             </a:fld>
             <a:endParaRPr lang="en-US"/>
           </a:p>
@@ -800,7 +802,7 @@
             <a:fld id="{1D8BD707-D9CF-40AE-B4C6-C98DA3205C09}" type="datetimeFigureOut">
               <a:rPr lang="en-US" smtClean="0"/>
               <a:pPr/>
-              <a:t>22-Jan-20</a:t>
+              <a:t>24-Jan-20</a:t>
             </a:fld>
             <a:endParaRPr lang="en-US"/>
           </a:p>
@@ -1043,7 +1045,7 @@
             <a:fld id="{1D8BD707-D9CF-40AE-B4C6-C98DA3205C09}" type="datetimeFigureOut">
               <a:rPr lang="en-US" smtClean="0"/>
               <a:pPr/>
-              <a:t>22-Jan-20</a:t>
+              <a:t>24-Jan-20</a:t>
             </a:fld>
             <a:endParaRPr lang="en-US"/>
           </a:p>
@@ -1328,7 +1330,7 @@
             <a:fld id="{1D8BD707-D9CF-40AE-B4C6-C98DA3205C09}" type="datetimeFigureOut">
               <a:rPr lang="en-US" smtClean="0"/>
               <a:pPr/>
-              <a:t>22-Jan-20</a:t>
+              <a:t>24-Jan-20</a:t>
             </a:fld>
             <a:endParaRPr lang="en-US"/>
           </a:p>
@@ -1747,7 +1749,7 @@
             <a:fld id="{1D8BD707-D9CF-40AE-B4C6-C98DA3205C09}" type="datetimeFigureOut">
               <a:rPr lang="en-US" smtClean="0"/>
               <a:pPr/>
-              <a:t>22-Jan-20</a:t>
+              <a:t>24-Jan-20</a:t>
             </a:fld>
             <a:endParaRPr lang="en-US"/>
           </a:p>
@@ -1862,7 +1864,7 @@
             <a:fld id="{1D8BD707-D9CF-40AE-B4C6-C98DA3205C09}" type="datetimeFigureOut">
               <a:rPr lang="en-US" smtClean="0"/>
               <a:pPr/>
-              <a:t>22-Jan-20</a:t>
+              <a:t>24-Jan-20</a:t>
             </a:fld>
             <a:endParaRPr lang="en-US"/>
           </a:p>
@@ -1954,7 +1956,7 @@
             <a:fld id="{1D8BD707-D9CF-40AE-B4C6-C98DA3205C09}" type="datetimeFigureOut">
               <a:rPr lang="en-US" smtClean="0"/>
               <a:pPr/>
-              <a:t>22-Jan-20</a:t>
+              <a:t>24-Jan-20</a:t>
             </a:fld>
             <a:endParaRPr lang="en-US"/>
           </a:p>
@@ -2228,7 +2230,7 @@
             <a:fld id="{1D8BD707-D9CF-40AE-B4C6-C98DA3205C09}" type="datetimeFigureOut">
               <a:rPr lang="en-US" smtClean="0"/>
               <a:pPr/>
-              <a:t>22-Jan-20</a:t>
+              <a:t>24-Jan-20</a:t>
             </a:fld>
             <a:endParaRPr lang="en-US"/>
           </a:p>
@@ -2478,7 +2480,7 @@
             <a:fld id="{1D8BD707-D9CF-40AE-B4C6-C98DA3205C09}" type="datetimeFigureOut">
               <a:rPr lang="en-US" smtClean="0"/>
               <a:pPr/>
-              <a:t>22-Jan-20</a:t>
+              <a:t>24-Jan-20</a:t>
             </a:fld>
             <a:endParaRPr lang="en-US"/>
           </a:p>
@@ -2688,7 +2690,7 @@
             <a:fld id="{1D8BD707-D9CF-40AE-B4C6-C98DA3205C09}" type="datetimeFigureOut">
               <a:rPr lang="en-US" smtClean="0"/>
               <a:pPr/>
-              <a:t>22-Jan-20</a:t>
+              <a:t>24-Jan-20</a:t>
             </a:fld>
             <a:endParaRPr lang="en-US"/>
           </a:p>
@@ -3182,6 +3184,192 @@
 </p:sld>
 </file>
 
+<file path=ppt/slides/slide2.xml><?xml version="1.0" encoding="utf-8"?>
+<p:sld xmlns:a="http://schemas.openxmlformats.org/drawingml/2006/main" xmlns:r="http://schemas.openxmlformats.org/officeDocument/2006/relationships" xmlns:p="http://schemas.openxmlformats.org/presentationml/2006/main">
+  <p:cSld>
+    <p:bg>
+      <p:bgPr>
+        <a:solidFill>
+          <a:schemeClr val="bg1">
+            <a:lumMod val="75000"/>
+          </a:schemeClr>
+        </a:solidFill>
+        <a:effectLst/>
+      </p:bgPr>
+    </p:bg>
+    <p:spTree>
+      <p:nvGrpSpPr>
+        <p:cNvPr id="1" name=""/>
+        <p:cNvGrpSpPr/>
+        <p:nvPr/>
+      </p:nvGrpSpPr>
+      <p:grpSpPr>
+        <a:xfrm>
+          <a:off x="0" y="0"/>
+          <a:ext cx="0" cy="0"/>
+          <a:chOff x="0" y="0"/>
+          <a:chExt cx="0" cy="0"/>
+        </a:xfrm>
+      </p:grpSpPr>
+      <p:sp>
+        <p:nvSpPr>
+          <p:cNvPr id="4" name="Oval 3"/>
+          <p:cNvSpPr/>
+          <p:nvPr/>
+        </p:nvSpPr>
+        <p:spPr>
+          <a:xfrm>
+            <a:off x="2978205" y="1835205"/>
+            <a:ext cx="3187590" cy="3187590"/>
+          </a:xfrm>
+          <a:prstGeom prst="ellipse">
+            <a:avLst/>
+          </a:prstGeom>
+          <a:solidFill>
+            <a:srgbClr val="FFFFFF">
+              <a:alpha val="50196"/>
+            </a:srgbClr>
+          </a:solidFill>
+          <a:ln w="76200">
+            <a:solidFill>
+              <a:srgbClr val="FFFFFF"/>
+            </a:solidFill>
+          </a:ln>
+        </p:spPr>
+        <p:style>
+          <a:lnRef idx="2">
+            <a:schemeClr val="accent1">
+              <a:shade val="50000"/>
+            </a:schemeClr>
+          </a:lnRef>
+          <a:fillRef idx="1">
+            <a:schemeClr val="accent1"/>
+          </a:fillRef>
+          <a:effectRef idx="0">
+            <a:schemeClr val="accent1"/>
+          </a:effectRef>
+          <a:fontRef idx="minor">
+            <a:schemeClr val="lt1"/>
+          </a:fontRef>
+        </p:style>
+        <p:txBody>
+          <a:bodyPr rtlCol="0" anchor="ctr"/>
+          <a:lstStyle/>
+          <a:p>
+            <a:pPr algn="ctr"/>
+            <a:endParaRPr lang="en-US"/>
+          </a:p>
+        </p:txBody>
+      </p:sp>
+    </p:spTree>
+    <p:extLst>
+      <p:ext uri="{BB962C8B-B14F-4D97-AF65-F5344CB8AC3E}">
+        <p14:creationId xmlns:p14="http://schemas.microsoft.com/office/powerpoint/2010/main" val="721858859"/>
+      </p:ext>
+    </p:extLst>
+  </p:cSld>
+  <p:clrMapOvr>
+    <a:masterClrMapping/>
+  </p:clrMapOvr>
+</p:sld>
+</file>
+
+<file path=ppt/slides/slide3.xml><?xml version="1.0" encoding="utf-8"?>
+<p:sld xmlns:a="http://schemas.openxmlformats.org/drawingml/2006/main" xmlns:r="http://schemas.openxmlformats.org/officeDocument/2006/relationships" xmlns:p="http://schemas.openxmlformats.org/presentationml/2006/main">
+  <p:cSld>
+    <p:bg>
+      <p:bgPr>
+        <a:solidFill>
+          <a:schemeClr val="bg1">
+            <a:lumMod val="75000"/>
+          </a:schemeClr>
+        </a:solidFill>
+        <a:effectLst/>
+      </p:bgPr>
+    </p:bg>
+    <p:spTree>
+      <p:nvGrpSpPr>
+        <p:cNvPr id="1" name=""/>
+        <p:cNvGrpSpPr/>
+        <p:nvPr/>
+      </p:nvGrpSpPr>
+      <p:grpSpPr>
+        <a:xfrm>
+          <a:off x="0" y="0"/>
+          <a:ext cx="0" cy="0"/>
+          <a:chOff x="0" y="0"/>
+          <a:chExt cx="0" cy="0"/>
+        </a:xfrm>
+      </p:grpSpPr>
+      <p:sp>
+        <p:nvSpPr>
+          <p:cNvPr id="4" name="Oval 3"/>
+          <p:cNvSpPr/>
+          <p:nvPr/>
+        </p:nvSpPr>
+        <p:spPr>
+          <a:xfrm flipV="1">
+            <a:off x="4268420" y="3125420"/>
+            <a:ext cx="607160" cy="607160"/>
+          </a:xfrm>
+          <a:prstGeom prst="ellipse">
+            <a:avLst/>
+          </a:prstGeom>
+          <a:solidFill>
+            <a:srgbClr val="FFFFFF"/>
+          </a:solidFill>
+          <a:ln w="76200">
+            <a:solidFill>
+              <a:schemeClr val="bg1"/>
+            </a:solidFill>
+          </a:ln>
+          <a:effectLst>
+            <a:glow rad="330200">
+              <a:srgbClr val="FFFFFF">
+                <a:alpha val="48000"/>
+              </a:srgbClr>
+            </a:glow>
+            <a:softEdge rad="0"/>
+          </a:effectLst>
+        </p:spPr>
+        <p:style>
+          <a:lnRef idx="2">
+            <a:schemeClr val="accent1">
+              <a:shade val="50000"/>
+            </a:schemeClr>
+          </a:lnRef>
+          <a:fillRef idx="1">
+            <a:schemeClr val="accent1"/>
+          </a:fillRef>
+          <a:effectRef idx="0">
+            <a:schemeClr val="accent1"/>
+          </a:effectRef>
+          <a:fontRef idx="minor">
+            <a:schemeClr val="lt1"/>
+          </a:fontRef>
+        </p:style>
+        <p:txBody>
+          <a:bodyPr rtlCol="0" anchor="ctr"/>
+          <a:lstStyle/>
+          <a:p>
+            <a:pPr algn="ctr"/>
+            <a:endParaRPr lang="en-US"/>
+          </a:p>
+        </p:txBody>
+      </p:sp>
+    </p:spTree>
+    <p:extLst>
+      <p:ext uri="{BB962C8B-B14F-4D97-AF65-F5344CB8AC3E}">
+        <p14:creationId xmlns:p14="http://schemas.microsoft.com/office/powerpoint/2010/main" val="1484257562"/>
+      </p:ext>
+    </p:extLst>
+  </p:cSld>
+  <p:clrMapOvr>
+    <a:masterClrMapping/>
+  </p:clrMapOvr>
+</p:sld>
+</file>
+
 <file path=ppt/theme/theme1.xml><?xml version="1.0" encoding="utf-8"?>
 <a:theme xmlns:a="http://schemas.openxmlformats.org/drawingml/2006/main" name="Office Theme">
   <a:themeElements>

</xml_diff>

<commit_message>
A lot of things are added with new gameplay and controls.
</commit_message>
<xml_diff>
--- a/MiningTown/Assets/Textures/TexturesIcons.pptx
+++ b/MiningTown/Assets/Textures/TexturesIcons.pptx
@@ -5,9 +5,15 @@
     <p:sldMasterId id="2147483648" r:id="rId1"/>
   </p:sldMasterIdLst>
   <p:sldIdLst>
-    <p:sldId id="256" r:id="rId2"/>
-    <p:sldId id="257" r:id="rId3"/>
-    <p:sldId id="258" r:id="rId4"/>
+    <p:sldId id="261" r:id="rId2"/>
+    <p:sldId id="263" r:id="rId3"/>
+    <p:sldId id="259" r:id="rId4"/>
+    <p:sldId id="256" r:id="rId5"/>
+    <p:sldId id="257" r:id="rId6"/>
+    <p:sldId id="260" r:id="rId7"/>
+    <p:sldId id="258" r:id="rId8"/>
+    <p:sldId id="262" r:id="rId9"/>
+    <p:sldId id="264" r:id="rId10"/>
   </p:sldIdLst>
   <p:sldSz cx="9144000" cy="6858000" type="screen4x3"/>
   <p:notesSz cx="6858000" cy="9144000"/>
@@ -106,6 +112,62 @@
       </a:defRPr>
     </a:lvl9pPr>
   </p:defaultTextStyle>
+  <p:extLst>
+    <p:ext uri="{EFAFB233-063F-42B5-8137-9DF3F51BA10A}">
+      <p15:sldGuideLst xmlns:p15="http://schemas.microsoft.com/office/powerpoint/2012/main">
+        <p15:guide id="1" orient="horz" pos="2160">
+          <p15:clr>
+            <a:srgbClr val="A4A3A4"/>
+          </p15:clr>
+        </p15:guide>
+        <p15:guide id="2" pos="2880" userDrawn="1">
+          <p15:clr>
+            <a:srgbClr val="A4A3A4"/>
+          </p15:clr>
+        </p15:guide>
+        <p15:guide id="3" pos="1905" userDrawn="1">
+          <p15:clr>
+            <a:srgbClr val="A4A3A4"/>
+          </p15:clr>
+        </p15:guide>
+        <p15:guide id="4" pos="3855" userDrawn="1">
+          <p15:clr>
+            <a:srgbClr val="A4A3A4"/>
+          </p15:clr>
+        </p15:guide>
+        <p15:guide id="5" orient="horz" pos="1185" userDrawn="1">
+          <p15:clr>
+            <a:srgbClr val="A4A3A4"/>
+          </p15:clr>
+        </p15:guide>
+        <p15:guide id="6" orient="horz" pos="3135" userDrawn="1">
+          <p15:clr>
+            <a:srgbClr val="A4A3A4"/>
+          </p15:clr>
+        </p15:guide>
+        <p15:guide id="7" pos="2404" userDrawn="1">
+          <p15:clr>
+            <a:srgbClr val="A4A3A4"/>
+          </p15:clr>
+        </p15:guide>
+        <p15:guide id="8" pos="3356" userDrawn="1">
+          <p15:clr>
+            <a:srgbClr val="A4A3A4"/>
+          </p15:clr>
+        </p15:guide>
+        <p15:guide id="9" orient="horz" pos="1684" userDrawn="1">
+          <p15:clr>
+            <a:srgbClr val="A4A3A4"/>
+          </p15:clr>
+        </p15:guide>
+        <p15:guide id="10" orient="horz" pos="2636" userDrawn="1">
+          <p15:clr>
+            <a:srgbClr val="A4A3A4"/>
+          </p15:clr>
+        </p15:guide>
+      </p15:sldGuideLst>
+    </p:ext>
+  </p:extLst>
 </p:presentation>
 </file>
 
@@ -147,10 +209,9 @@
           <a:lstStyle/>
           <a:p>
             <a:r>
-              <a:rPr lang="en-US" smtClean="0"/>
+              <a:rPr lang="en-US"/>
               <a:t>Click to edit Master title style</a:t>
             </a:r>
-            <a:endParaRPr lang="en-US"/>
           </a:p>
         </p:txBody>
       </p:sp>
@@ -266,10 +327,9 @@
           </a:lstStyle>
           <a:p>
             <a:r>
-              <a:rPr lang="en-US" smtClean="0"/>
+              <a:rPr lang="en-US"/>
               <a:t>Click to edit Master subtitle style</a:t>
             </a:r>
-            <a:endParaRPr lang="en-US"/>
           </a:p>
         </p:txBody>
       </p:sp>
@@ -291,7 +351,7 @@
             <a:fld id="{1D8BD707-D9CF-40AE-B4C6-C98DA3205C09}" type="datetimeFigureOut">
               <a:rPr lang="en-US" smtClean="0"/>
               <a:pPr/>
-              <a:t>24-Jan-20</a:t>
+              <a:t>5/10/2020</a:t>
             </a:fld>
             <a:endParaRPr lang="en-US"/>
           </a:p>
@@ -381,10 +441,9 @@
           <a:lstStyle/>
           <a:p>
             <a:r>
-              <a:rPr lang="en-US" smtClean="0"/>
+              <a:rPr lang="en-US"/>
               <a:t>Click to edit Master title style</a:t>
             </a:r>
-            <a:endParaRPr lang="en-US"/>
           </a:p>
         </p:txBody>
       </p:sp>
@@ -405,38 +464,37 @@
           <a:p>
             <a:pPr lvl="0"/>
             <a:r>
-              <a:rPr lang="en-US" smtClean="0"/>
+              <a:rPr lang="en-US"/>
               <a:t>Click to edit Master text styles</a:t>
             </a:r>
           </a:p>
           <a:p>
             <a:pPr lvl="1"/>
             <a:r>
-              <a:rPr lang="en-US" smtClean="0"/>
+              <a:rPr lang="en-US"/>
               <a:t>Second level</a:t>
             </a:r>
           </a:p>
           <a:p>
             <a:pPr lvl="2"/>
             <a:r>
-              <a:rPr lang="en-US" smtClean="0"/>
+              <a:rPr lang="en-US"/>
               <a:t>Third level</a:t>
             </a:r>
           </a:p>
           <a:p>
             <a:pPr lvl="3"/>
             <a:r>
-              <a:rPr lang="en-US" smtClean="0"/>
+              <a:rPr lang="en-US"/>
               <a:t>Fourth level</a:t>
             </a:r>
           </a:p>
           <a:p>
             <a:pPr lvl="4"/>
             <a:r>
-              <a:rPr lang="en-US" smtClean="0"/>
+              <a:rPr lang="en-US"/>
               <a:t>Fifth level</a:t>
             </a:r>
-            <a:endParaRPr lang="en-US"/>
           </a:p>
         </p:txBody>
       </p:sp>
@@ -458,7 +516,7 @@
             <a:fld id="{1D8BD707-D9CF-40AE-B4C6-C98DA3205C09}" type="datetimeFigureOut">
               <a:rPr lang="en-US" smtClean="0"/>
               <a:pPr/>
-              <a:t>24-Jan-20</a:t>
+              <a:t>5/10/2020</a:t>
             </a:fld>
             <a:endParaRPr lang="en-US"/>
           </a:p>
@@ -553,10 +611,9 @@
           <a:lstStyle/>
           <a:p>
             <a:r>
-              <a:rPr lang="en-US" smtClean="0"/>
+              <a:rPr lang="en-US"/>
               <a:t>Click to edit Master title style</a:t>
             </a:r>
-            <a:endParaRPr lang="en-US"/>
           </a:p>
         </p:txBody>
       </p:sp>
@@ -582,38 +639,37 @@
           <a:p>
             <a:pPr lvl="0"/>
             <a:r>
-              <a:rPr lang="en-US" smtClean="0"/>
+              <a:rPr lang="en-US"/>
               <a:t>Click to edit Master text styles</a:t>
             </a:r>
           </a:p>
           <a:p>
             <a:pPr lvl="1"/>
             <a:r>
-              <a:rPr lang="en-US" smtClean="0"/>
+              <a:rPr lang="en-US"/>
               <a:t>Second level</a:t>
             </a:r>
           </a:p>
           <a:p>
             <a:pPr lvl="2"/>
             <a:r>
-              <a:rPr lang="en-US" smtClean="0"/>
+              <a:rPr lang="en-US"/>
               <a:t>Third level</a:t>
             </a:r>
           </a:p>
           <a:p>
             <a:pPr lvl="3"/>
             <a:r>
-              <a:rPr lang="en-US" smtClean="0"/>
+              <a:rPr lang="en-US"/>
               <a:t>Fourth level</a:t>
             </a:r>
           </a:p>
           <a:p>
             <a:pPr lvl="4"/>
             <a:r>
-              <a:rPr lang="en-US" smtClean="0"/>
+              <a:rPr lang="en-US"/>
               <a:t>Fifth level</a:t>
             </a:r>
-            <a:endParaRPr lang="en-US"/>
           </a:p>
         </p:txBody>
       </p:sp>
@@ -635,7 +691,7 @@
             <a:fld id="{1D8BD707-D9CF-40AE-B4C6-C98DA3205C09}" type="datetimeFigureOut">
               <a:rPr lang="en-US" smtClean="0"/>
               <a:pPr/>
-              <a:t>24-Jan-20</a:t>
+              <a:t>5/10/2020</a:t>
             </a:fld>
             <a:endParaRPr lang="en-US"/>
           </a:p>
@@ -725,10 +781,9 @@
           <a:lstStyle/>
           <a:p>
             <a:r>
-              <a:rPr lang="en-US" smtClean="0"/>
+              <a:rPr lang="en-US"/>
               <a:t>Click to edit Master title style</a:t>
             </a:r>
-            <a:endParaRPr lang="en-US"/>
           </a:p>
         </p:txBody>
       </p:sp>
@@ -749,38 +804,37 @@
           <a:p>
             <a:pPr lvl="0"/>
             <a:r>
-              <a:rPr lang="en-US" smtClean="0"/>
+              <a:rPr lang="en-US"/>
               <a:t>Click to edit Master text styles</a:t>
             </a:r>
           </a:p>
           <a:p>
             <a:pPr lvl="1"/>
             <a:r>
-              <a:rPr lang="en-US" smtClean="0"/>
+              <a:rPr lang="en-US"/>
               <a:t>Second level</a:t>
             </a:r>
           </a:p>
           <a:p>
             <a:pPr lvl="2"/>
             <a:r>
-              <a:rPr lang="en-US" smtClean="0"/>
+              <a:rPr lang="en-US"/>
               <a:t>Third level</a:t>
             </a:r>
           </a:p>
           <a:p>
             <a:pPr lvl="3"/>
             <a:r>
-              <a:rPr lang="en-US" smtClean="0"/>
+              <a:rPr lang="en-US"/>
               <a:t>Fourth level</a:t>
             </a:r>
           </a:p>
           <a:p>
             <a:pPr lvl="4"/>
             <a:r>
-              <a:rPr lang="en-US" smtClean="0"/>
+              <a:rPr lang="en-US"/>
               <a:t>Fifth level</a:t>
             </a:r>
-            <a:endParaRPr lang="en-US"/>
           </a:p>
         </p:txBody>
       </p:sp>
@@ -802,7 +856,7 @@
             <a:fld id="{1D8BD707-D9CF-40AE-B4C6-C98DA3205C09}" type="datetimeFigureOut">
               <a:rPr lang="en-US" smtClean="0"/>
               <a:pPr/>
-              <a:t>24-Jan-20</a:t>
+              <a:t>5/10/2020</a:t>
             </a:fld>
             <a:endParaRPr lang="en-US"/>
           </a:p>
@@ -901,10 +955,9 @@
           </a:lstStyle>
           <a:p>
             <a:r>
-              <a:rPr lang="en-US" smtClean="0"/>
+              <a:rPr lang="en-US"/>
               <a:t>Click to edit Master title style</a:t>
             </a:r>
-            <a:endParaRPr lang="en-US"/>
           </a:p>
         </p:txBody>
       </p:sp>
@@ -1021,7 +1074,7 @@
           <a:p>
             <a:pPr lvl="0"/>
             <a:r>
-              <a:rPr lang="en-US" smtClean="0"/>
+              <a:rPr lang="en-US"/>
               <a:t>Click to edit Master text styles</a:t>
             </a:r>
           </a:p>
@@ -1045,7 +1098,7 @@
             <a:fld id="{1D8BD707-D9CF-40AE-B4C6-C98DA3205C09}" type="datetimeFigureOut">
               <a:rPr lang="en-US" smtClean="0"/>
               <a:pPr/>
-              <a:t>24-Jan-20</a:t>
+              <a:t>5/10/2020</a:t>
             </a:fld>
             <a:endParaRPr lang="en-US"/>
           </a:p>
@@ -1135,10 +1188,9 @@
           <a:lstStyle/>
           <a:p>
             <a:r>
-              <a:rPr lang="en-US" smtClean="0"/>
+              <a:rPr lang="en-US"/>
               <a:t>Click to edit Master title style</a:t>
             </a:r>
-            <a:endParaRPr lang="en-US"/>
           </a:p>
         </p:txBody>
       </p:sp>
@@ -1192,38 +1244,37 @@
           <a:p>
             <a:pPr lvl="0"/>
             <a:r>
-              <a:rPr lang="en-US" smtClean="0"/>
+              <a:rPr lang="en-US"/>
               <a:t>Click to edit Master text styles</a:t>
             </a:r>
           </a:p>
           <a:p>
             <a:pPr lvl="1"/>
             <a:r>
-              <a:rPr lang="en-US" smtClean="0"/>
+              <a:rPr lang="en-US"/>
               <a:t>Second level</a:t>
             </a:r>
           </a:p>
           <a:p>
             <a:pPr lvl="2"/>
             <a:r>
-              <a:rPr lang="en-US" smtClean="0"/>
+              <a:rPr lang="en-US"/>
               <a:t>Third level</a:t>
             </a:r>
           </a:p>
           <a:p>
             <a:pPr lvl="3"/>
             <a:r>
-              <a:rPr lang="en-US" smtClean="0"/>
+              <a:rPr lang="en-US"/>
               <a:t>Fourth level</a:t>
             </a:r>
           </a:p>
           <a:p>
             <a:pPr lvl="4"/>
             <a:r>
-              <a:rPr lang="en-US" smtClean="0"/>
+              <a:rPr lang="en-US"/>
               <a:t>Fifth level</a:t>
             </a:r>
-            <a:endParaRPr lang="en-US"/>
           </a:p>
         </p:txBody>
       </p:sp>
@@ -1277,38 +1328,37 @@
           <a:p>
             <a:pPr lvl="0"/>
             <a:r>
-              <a:rPr lang="en-US" smtClean="0"/>
+              <a:rPr lang="en-US"/>
               <a:t>Click to edit Master text styles</a:t>
             </a:r>
           </a:p>
           <a:p>
             <a:pPr lvl="1"/>
             <a:r>
-              <a:rPr lang="en-US" smtClean="0"/>
+              <a:rPr lang="en-US"/>
               <a:t>Second level</a:t>
             </a:r>
           </a:p>
           <a:p>
             <a:pPr lvl="2"/>
             <a:r>
-              <a:rPr lang="en-US" smtClean="0"/>
+              <a:rPr lang="en-US"/>
               <a:t>Third level</a:t>
             </a:r>
           </a:p>
           <a:p>
             <a:pPr lvl="3"/>
             <a:r>
-              <a:rPr lang="en-US" smtClean="0"/>
+              <a:rPr lang="en-US"/>
               <a:t>Fourth level</a:t>
             </a:r>
           </a:p>
           <a:p>
             <a:pPr lvl="4"/>
             <a:r>
-              <a:rPr lang="en-US" smtClean="0"/>
+              <a:rPr lang="en-US"/>
               <a:t>Fifth level</a:t>
             </a:r>
-            <a:endParaRPr lang="en-US"/>
           </a:p>
         </p:txBody>
       </p:sp>
@@ -1330,7 +1380,7 @@
             <a:fld id="{1D8BD707-D9CF-40AE-B4C6-C98DA3205C09}" type="datetimeFigureOut">
               <a:rPr lang="en-US" smtClean="0"/>
               <a:pPr/>
-              <a:t>24-Jan-20</a:t>
+              <a:t>5/10/2020</a:t>
             </a:fld>
             <a:endParaRPr lang="en-US"/>
           </a:p>
@@ -1424,10 +1474,9 @@
           </a:lstStyle>
           <a:p>
             <a:r>
-              <a:rPr lang="en-US" smtClean="0"/>
+              <a:rPr lang="en-US"/>
               <a:t>Click to edit Master title style</a:t>
             </a:r>
-            <a:endParaRPr lang="en-US"/>
           </a:p>
         </p:txBody>
       </p:sp>
@@ -1490,7 +1539,7 @@
           <a:p>
             <a:pPr lvl="0"/>
             <a:r>
-              <a:rPr lang="en-US" smtClean="0"/>
+              <a:rPr lang="en-US"/>
               <a:t>Click to edit Master text styles</a:t>
             </a:r>
           </a:p>
@@ -1546,38 +1595,37 @@
           <a:p>
             <a:pPr lvl="0"/>
             <a:r>
-              <a:rPr lang="en-US" smtClean="0"/>
+              <a:rPr lang="en-US"/>
               <a:t>Click to edit Master text styles</a:t>
             </a:r>
           </a:p>
           <a:p>
             <a:pPr lvl="1"/>
             <a:r>
-              <a:rPr lang="en-US" smtClean="0"/>
+              <a:rPr lang="en-US"/>
               <a:t>Second level</a:t>
             </a:r>
           </a:p>
           <a:p>
             <a:pPr lvl="2"/>
             <a:r>
-              <a:rPr lang="en-US" smtClean="0"/>
+              <a:rPr lang="en-US"/>
               <a:t>Third level</a:t>
             </a:r>
           </a:p>
           <a:p>
             <a:pPr lvl="3"/>
             <a:r>
-              <a:rPr lang="en-US" smtClean="0"/>
+              <a:rPr lang="en-US"/>
               <a:t>Fourth level</a:t>
             </a:r>
           </a:p>
           <a:p>
             <a:pPr lvl="4"/>
             <a:r>
-              <a:rPr lang="en-US" smtClean="0"/>
+              <a:rPr lang="en-US"/>
               <a:t>Fifth level</a:t>
             </a:r>
-            <a:endParaRPr lang="en-US"/>
           </a:p>
         </p:txBody>
       </p:sp>
@@ -1640,7 +1688,7 @@
           <a:p>
             <a:pPr lvl="0"/>
             <a:r>
-              <a:rPr lang="en-US" smtClean="0"/>
+              <a:rPr lang="en-US"/>
               <a:t>Click to edit Master text styles</a:t>
             </a:r>
           </a:p>
@@ -1696,38 +1744,37 @@
           <a:p>
             <a:pPr lvl="0"/>
             <a:r>
-              <a:rPr lang="en-US" smtClean="0"/>
+              <a:rPr lang="en-US"/>
               <a:t>Click to edit Master text styles</a:t>
             </a:r>
           </a:p>
           <a:p>
             <a:pPr lvl="1"/>
             <a:r>
-              <a:rPr lang="en-US" smtClean="0"/>
+              <a:rPr lang="en-US"/>
               <a:t>Second level</a:t>
             </a:r>
           </a:p>
           <a:p>
             <a:pPr lvl="2"/>
             <a:r>
-              <a:rPr lang="en-US" smtClean="0"/>
+              <a:rPr lang="en-US"/>
               <a:t>Third level</a:t>
             </a:r>
           </a:p>
           <a:p>
             <a:pPr lvl="3"/>
             <a:r>
-              <a:rPr lang="en-US" smtClean="0"/>
+              <a:rPr lang="en-US"/>
               <a:t>Fourth level</a:t>
             </a:r>
           </a:p>
           <a:p>
             <a:pPr lvl="4"/>
             <a:r>
-              <a:rPr lang="en-US" smtClean="0"/>
+              <a:rPr lang="en-US"/>
               <a:t>Fifth level</a:t>
             </a:r>
-            <a:endParaRPr lang="en-US"/>
           </a:p>
         </p:txBody>
       </p:sp>
@@ -1749,7 +1796,7 @@
             <a:fld id="{1D8BD707-D9CF-40AE-B4C6-C98DA3205C09}" type="datetimeFigureOut">
               <a:rPr lang="en-US" smtClean="0"/>
               <a:pPr/>
-              <a:t>24-Jan-20</a:t>
+              <a:t>5/10/2020</a:t>
             </a:fld>
             <a:endParaRPr lang="en-US"/>
           </a:p>
@@ -1839,10 +1886,9 @@
           <a:lstStyle/>
           <a:p>
             <a:r>
-              <a:rPr lang="en-US" smtClean="0"/>
+              <a:rPr lang="en-US"/>
               <a:t>Click to edit Master title style</a:t>
             </a:r>
-            <a:endParaRPr lang="en-US"/>
           </a:p>
         </p:txBody>
       </p:sp>
@@ -1864,7 +1910,7 @@
             <a:fld id="{1D8BD707-D9CF-40AE-B4C6-C98DA3205C09}" type="datetimeFigureOut">
               <a:rPr lang="en-US" smtClean="0"/>
               <a:pPr/>
-              <a:t>24-Jan-20</a:t>
+              <a:t>5/10/2020</a:t>
             </a:fld>
             <a:endParaRPr lang="en-US"/>
           </a:p>
@@ -1956,7 +2002,7 @@
             <a:fld id="{1D8BD707-D9CF-40AE-B4C6-C98DA3205C09}" type="datetimeFigureOut">
               <a:rPr lang="en-US" smtClean="0"/>
               <a:pPr/>
-              <a:t>24-Jan-20</a:t>
+              <a:t>5/10/2020</a:t>
             </a:fld>
             <a:endParaRPr lang="en-US"/>
           </a:p>
@@ -2055,10 +2101,9 @@
           </a:lstStyle>
           <a:p>
             <a:r>
-              <a:rPr lang="en-US" smtClean="0"/>
+              <a:rPr lang="en-US"/>
               <a:t>Click to edit Master title style</a:t>
             </a:r>
-            <a:endParaRPr lang="en-US"/>
           </a:p>
         </p:txBody>
       </p:sp>
@@ -2112,38 +2157,37 @@
           <a:p>
             <a:pPr lvl="0"/>
             <a:r>
-              <a:rPr lang="en-US" smtClean="0"/>
+              <a:rPr lang="en-US"/>
               <a:t>Click to edit Master text styles</a:t>
             </a:r>
           </a:p>
           <a:p>
             <a:pPr lvl="1"/>
             <a:r>
-              <a:rPr lang="en-US" smtClean="0"/>
+              <a:rPr lang="en-US"/>
               <a:t>Second level</a:t>
             </a:r>
           </a:p>
           <a:p>
             <a:pPr lvl="2"/>
             <a:r>
-              <a:rPr lang="en-US" smtClean="0"/>
+              <a:rPr lang="en-US"/>
               <a:t>Third level</a:t>
             </a:r>
           </a:p>
           <a:p>
             <a:pPr lvl="3"/>
             <a:r>
-              <a:rPr lang="en-US" smtClean="0"/>
+              <a:rPr lang="en-US"/>
               <a:t>Fourth level</a:t>
             </a:r>
           </a:p>
           <a:p>
             <a:pPr lvl="4"/>
             <a:r>
-              <a:rPr lang="en-US" smtClean="0"/>
+              <a:rPr lang="en-US"/>
               <a:t>Fifth level</a:t>
             </a:r>
-            <a:endParaRPr lang="en-US"/>
           </a:p>
         </p:txBody>
       </p:sp>
@@ -2206,7 +2250,7 @@
           <a:p>
             <a:pPr lvl="0"/>
             <a:r>
-              <a:rPr lang="en-US" smtClean="0"/>
+              <a:rPr lang="en-US"/>
               <a:t>Click to edit Master text styles</a:t>
             </a:r>
           </a:p>
@@ -2230,7 +2274,7 @@
             <a:fld id="{1D8BD707-D9CF-40AE-B4C6-C98DA3205C09}" type="datetimeFigureOut">
               <a:rPr lang="en-US" smtClean="0"/>
               <a:pPr/>
-              <a:t>24-Jan-20</a:t>
+              <a:t>5/10/2020</a:t>
             </a:fld>
             <a:endParaRPr lang="en-US"/>
           </a:p>
@@ -2329,10 +2373,9 @@
           </a:lstStyle>
           <a:p>
             <a:r>
-              <a:rPr lang="en-US" smtClean="0"/>
+              <a:rPr lang="en-US"/>
               <a:t>Click to edit Master title style</a:t>
             </a:r>
-            <a:endParaRPr lang="en-US"/>
           </a:p>
         </p:txBody>
       </p:sp>
@@ -2456,7 +2499,7 @@
           <a:p>
             <a:pPr lvl="0"/>
             <a:r>
-              <a:rPr lang="en-US" smtClean="0"/>
+              <a:rPr lang="en-US"/>
               <a:t>Click to edit Master text styles</a:t>
             </a:r>
           </a:p>
@@ -2480,7 +2523,7 @@
             <a:fld id="{1D8BD707-D9CF-40AE-B4C6-C98DA3205C09}" type="datetimeFigureOut">
               <a:rPr lang="en-US" smtClean="0"/>
               <a:pPr/>
-              <a:t>24-Jan-20</a:t>
+              <a:t>5/10/2020</a:t>
             </a:fld>
             <a:endParaRPr lang="en-US"/>
           </a:p>
@@ -2585,10 +2628,9 @@
           <a:lstStyle/>
           <a:p>
             <a:r>
-              <a:rPr lang="en-US" smtClean="0"/>
+              <a:rPr lang="en-US"/>
               <a:t>Click to edit Master title style</a:t>
             </a:r>
-            <a:endParaRPr lang="en-US"/>
           </a:p>
         </p:txBody>
       </p:sp>
@@ -2619,38 +2661,37 @@
           <a:p>
             <a:pPr lvl="0"/>
             <a:r>
-              <a:rPr lang="en-US" smtClean="0"/>
+              <a:rPr lang="en-US"/>
               <a:t>Click to edit Master text styles</a:t>
             </a:r>
           </a:p>
           <a:p>
             <a:pPr lvl="1"/>
             <a:r>
-              <a:rPr lang="en-US" smtClean="0"/>
+              <a:rPr lang="en-US"/>
               <a:t>Second level</a:t>
             </a:r>
           </a:p>
           <a:p>
             <a:pPr lvl="2"/>
             <a:r>
-              <a:rPr lang="en-US" smtClean="0"/>
+              <a:rPr lang="en-US"/>
               <a:t>Third level</a:t>
             </a:r>
           </a:p>
           <a:p>
             <a:pPr lvl="3"/>
             <a:r>
-              <a:rPr lang="en-US" smtClean="0"/>
+              <a:rPr lang="en-US"/>
               <a:t>Fourth level</a:t>
             </a:r>
           </a:p>
           <a:p>
             <a:pPr lvl="4"/>
             <a:r>
-              <a:rPr lang="en-US" smtClean="0"/>
+              <a:rPr lang="en-US"/>
               <a:t>Fifth level</a:t>
             </a:r>
-            <a:endParaRPr lang="en-US"/>
           </a:p>
         </p:txBody>
       </p:sp>
@@ -2690,7 +2731,7 @@
             <a:fld id="{1D8BD707-D9CF-40AE-B4C6-C98DA3205C09}" type="datetimeFigureOut">
               <a:rPr lang="en-US" smtClean="0"/>
               <a:pPr/>
-              <a:t>24-Jan-20</a:t>
+              <a:t>5/10/2020</a:t>
             </a:fld>
             <a:endParaRPr lang="en-US"/>
           </a:p>
@@ -3073,26 +3114,26 @@
       </p:grpSpPr>
       <p:sp>
         <p:nvSpPr>
-          <p:cNvPr id="4" name="Rounded Rectangle 3"/>
+          <p:cNvPr id="2" name="Rectangle 1">
+            <a:extLst>
+              <a:ext uri="{FF2B5EF4-FFF2-40B4-BE49-F238E27FC236}">
+                <a16:creationId xmlns:a16="http://schemas.microsoft.com/office/drawing/2014/main" id="{32C61CE2-8423-40A5-BD57-CB60A710678F}"/>
+              </a:ext>
+            </a:extLst>
+          </p:cNvPr>
           <p:cNvSpPr/>
           <p:nvPr/>
         </p:nvSpPr>
         <p:spPr>
           <a:xfrm>
-            <a:off x="2705100" y="3162300"/>
-            <a:ext cx="3733800" cy="533400"/>
+            <a:off x="4114800" y="2971800"/>
+            <a:ext cx="914400" cy="914400"/>
           </a:xfrm>
-          <a:prstGeom prst="roundRect">
-            <a:avLst>
-              <a:gd name="adj" fmla="val 50000"/>
-            </a:avLst>
+          <a:prstGeom prst="rect">
+            <a:avLst/>
           </a:prstGeom>
-          <a:solidFill>
-            <a:srgbClr val="FFFFFF">
-              <a:alpha val="27059"/>
-            </a:srgbClr>
-          </a:solidFill>
-          <a:ln>
+          <a:noFill/>
+          <a:ln w="38100">
             <a:solidFill>
               <a:schemeClr val="bg1"/>
             </a:solidFill>
@@ -3119,62 +3160,14 @@
           <a:lstStyle/>
           <a:p>
             <a:pPr algn="ctr"/>
-            <a:endParaRPr lang="en-US"/>
-          </a:p>
-        </p:txBody>
-      </p:sp>
-      <p:sp>
-        <p:nvSpPr>
-          <p:cNvPr id="5" name="Rounded Rectangle 4"/>
-          <p:cNvSpPr/>
-          <p:nvPr/>
-        </p:nvSpPr>
-        <p:spPr>
-          <a:xfrm>
-            <a:off x="2763830" y="2594155"/>
-            <a:ext cx="3675070" cy="487910"/>
-          </a:xfrm>
-          <a:prstGeom prst="roundRect">
-            <a:avLst>
-              <a:gd name="adj" fmla="val 50000"/>
-            </a:avLst>
-          </a:prstGeom>
-          <a:solidFill>
-            <a:schemeClr val="bg1"/>
-          </a:solidFill>
-          <a:ln>
-            <a:noFill/>
-          </a:ln>
-        </p:spPr>
-        <p:style>
-          <a:lnRef idx="2">
-            <a:schemeClr val="accent1">
-              <a:shade val="50000"/>
-            </a:schemeClr>
-          </a:lnRef>
-          <a:fillRef idx="1">
-            <a:schemeClr val="accent1"/>
-          </a:fillRef>
-          <a:effectRef idx="0">
-            <a:schemeClr val="accent1"/>
-          </a:effectRef>
-          <a:fontRef idx="minor">
-            <a:schemeClr val="lt1"/>
-          </a:fontRef>
-        </p:style>
-        <p:txBody>
-          <a:bodyPr rtlCol="0" anchor="ctr"/>
-          <a:lstStyle/>
-          <a:p>
-            <a:pPr algn="ctr"/>
-            <a:endParaRPr lang="en-US"/>
+            <a:endParaRPr lang="en-IN"/>
           </a:p>
         </p:txBody>
       </p:sp>
     </p:spTree>
     <p:extLst>
       <p:ext uri="{BB962C8B-B14F-4D97-AF65-F5344CB8AC3E}">
-        <p14:creationId xmlns:p14="http://schemas.microsoft.com/office/powerpoint/2010/main" val="2921418593"/>
+        <p14:creationId xmlns:p14="http://schemas.microsoft.com/office/powerpoint/2010/main" val="1141604764"/>
       </p:ext>
     </p:extLst>
   </p:cSld>
@@ -3213,7 +3206,788 @@
       </p:grpSpPr>
       <p:sp>
         <p:nvSpPr>
-          <p:cNvPr id="4" name="Oval 3"/>
+          <p:cNvPr id="5" name="Oval 4">
+            <a:extLst>
+              <a:ext uri="{FF2B5EF4-FFF2-40B4-BE49-F238E27FC236}">
+                <a16:creationId xmlns:a16="http://schemas.microsoft.com/office/drawing/2014/main" id="{5CE85C29-C9E0-4DC2-9692-A83A4E8ECB26}"/>
+              </a:ext>
+            </a:extLst>
+          </p:cNvPr>
+          <p:cNvSpPr/>
+          <p:nvPr/>
+        </p:nvSpPr>
+        <p:spPr>
+          <a:xfrm>
+            <a:off x="3177268" y="2047875"/>
+            <a:ext cx="2764174" cy="2764174"/>
+          </a:xfrm>
+          <a:prstGeom prst="ellipse">
+            <a:avLst/>
+          </a:prstGeom>
+          <a:gradFill>
+            <a:gsLst>
+              <a:gs pos="41000">
+                <a:srgbClr val="F9FBFD">
+                  <a:alpha val="0"/>
+                </a:srgbClr>
+              </a:gs>
+              <a:gs pos="0">
+                <a:srgbClr val="F6F9FC">
+                  <a:alpha val="0"/>
+                </a:srgbClr>
+              </a:gs>
+              <a:gs pos="100000">
+                <a:schemeClr val="bg1"/>
+              </a:gs>
+            </a:gsLst>
+            <a:path path="circle">
+              <a:fillToRect l="50000" t="50000" r="50000" b="50000"/>
+            </a:path>
+          </a:gradFill>
+          <a:ln w="101600">
+            <a:noFill/>
+          </a:ln>
+        </p:spPr>
+        <p:style>
+          <a:lnRef idx="2">
+            <a:schemeClr val="accent1">
+              <a:shade val="50000"/>
+            </a:schemeClr>
+          </a:lnRef>
+          <a:fillRef idx="1">
+            <a:schemeClr val="accent1"/>
+          </a:fillRef>
+          <a:effectRef idx="0">
+            <a:schemeClr val="accent1"/>
+          </a:effectRef>
+          <a:fontRef idx="minor">
+            <a:schemeClr val="lt1"/>
+          </a:fontRef>
+        </p:style>
+        <p:txBody>
+          <a:bodyPr rtlCol="0" anchor="ctr"/>
+          <a:lstStyle/>
+          <a:p>
+            <a:pPr algn="ctr"/>
+            <a:endParaRPr lang="en-US" dirty="0"/>
+          </a:p>
+        </p:txBody>
+      </p:sp>
+      <p:sp>
+        <p:nvSpPr>
+          <p:cNvPr id="3" name="Block Arc 2">
+            <a:extLst>
+              <a:ext uri="{FF2B5EF4-FFF2-40B4-BE49-F238E27FC236}">
+                <a16:creationId xmlns:a16="http://schemas.microsoft.com/office/drawing/2014/main" id="{55727453-48C0-4248-AC8F-2458A300A257}"/>
+              </a:ext>
+            </a:extLst>
+          </p:cNvPr>
+          <p:cNvSpPr/>
+          <p:nvPr/>
+        </p:nvSpPr>
+        <p:spPr>
+          <a:xfrm>
+            <a:off x="2978205" y="1847850"/>
+            <a:ext cx="3162300" cy="3162300"/>
+          </a:xfrm>
+          <a:prstGeom prst="blockArc">
+            <a:avLst>
+              <a:gd name="adj1" fmla="val 10800000"/>
+              <a:gd name="adj2" fmla="val 16223790"/>
+              <a:gd name="adj3" fmla="val 6475"/>
+            </a:avLst>
+          </a:prstGeom>
+          <a:solidFill>
+            <a:schemeClr val="bg1"/>
+          </a:solidFill>
+          <a:ln>
+            <a:noFill/>
+          </a:ln>
+          <a:scene3d>
+            <a:camera prst="orthographicFront"/>
+            <a:lightRig rig="threePt" dir="t"/>
+          </a:scene3d>
+          <a:sp3d>
+            <a:bevelT w="190500"/>
+          </a:sp3d>
+        </p:spPr>
+        <p:style>
+          <a:lnRef idx="2">
+            <a:schemeClr val="accent1">
+              <a:shade val="50000"/>
+            </a:schemeClr>
+          </a:lnRef>
+          <a:fillRef idx="1">
+            <a:schemeClr val="accent1"/>
+          </a:fillRef>
+          <a:effectRef idx="0">
+            <a:schemeClr val="accent1"/>
+          </a:effectRef>
+          <a:fontRef idx="minor">
+            <a:schemeClr val="lt1"/>
+          </a:fontRef>
+        </p:style>
+        <p:txBody>
+          <a:bodyPr rtlCol="0" anchor="ctr"/>
+          <a:lstStyle/>
+          <a:p>
+            <a:pPr algn="ctr"/>
+            <a:endParaRPr lang="en-IN" dirty="0">
+              <a:solidFill>
+                <a:schemeClr val="tx1"/>
+              </a:solidFill>
+            </a:endParaRPr>
+          </a:p>
+        </p:txBody>
+      </p:sp>
+      <p:sp>
+        <p:nvSpPr>
+          <p:cNvPr id="10" name="Block Arc 9">
+            <a:extLst>
+              <a:ext uri="{FF2B5EF4-FFF2-40B4-BE49-F238E27FC236}">
+                <a16:creationId xmlns:a16="http://schemas.microsoft.com/office/drawing/2014/main" id="{22EF910F-387C-4573-AA1C-23739886E288}"/>
+              </a:ext>
+            </a:extLst>
+          </p:cNvPr>
+          <p:cNvSpPr/>
+          <p:nvPr/>
+        </p:nvSpPr>
+        <p:spPr>
+          <a:xfrm rot="7200000">
+            <a:off x="2992492" y="1847850"/>
+            <a:ext cx="3162300" cy="3162300"/>
+          </a:xfrm>
+          <a:prstGeom prst="blockArc">
+            <a:avLst>
+              <a:gd name="adj1" fmla="val 10800000"/>
+              <a:gd name="adj2" fmla="val 16223790"/>
+              <a:gd name="adj3" fmla="val 6475"/>
+            </a:avLst>
+          </a:prstGeom>
+          <a:solidFill>
+            <a:schemeClr val="bg1"/>
+          </a:solidFill>
+          <a:ln>
+            <a:noFill/>
+          </a:ln>
+          <a:scene3d>
+            <a:camera prst="orthographicFront"/>
+            <a:lightRig rig="threePt" dir="t"/>
+          </a:scene3d>
+          <a:sp3d>
+            <a:bevelT w="190500"/>
+          </a:sp3d>
+        </p:spPr>
+        <p:style>
+          <a:lnRef idx="2">
+            <a:schemeClr val="accent1">
+              <a:shade val="50000"/>
+            </a:schemeClr>
+          </a:lnRef>
+          <a:fillRef idx="1">
+            <a:schemeClr val="accent1"/>
+          </a:fillRef>
+          <a:effectRef idx="0">
+            <a:schemeClr val="accent1"/>
+          </a:effectRef>
+          <a:fontRef idx="minor">
+            <a:schemeClr val="lt1"/>
+          </a:fontRef>
+        </p:style>
+        <p:txBody>
+          <a:bodyPr rtlCol="0" anchor="ctr"/>
+          <a:lstStyle/>
+          <a:p>
+            <a:pPr algn="ctr"/>
+            <a:endParaRPr lang="en-IN">
+              <a:solidFill>
+                <a:schemeClr val="tx1"/>
+              </a:solidFill>
+            </a:endParaRPr>
+          </a:p>
+        </p:txBody>
+      </p:sp>
+      <p:sp>
+        <p:nvSpPr>
+          <p:cNvPr id="11" name="Block Arc 10">
+            <a:extLst>
+              <a:ext uri="{FF2B5EF4-FFF2-40B4-BE49-F238E27FC236}">
+                <a16:creationId xmlns:a16="http://schemas.microsoft.com/office/drawing/2014/main" id="{FCECEC34-98B0-40FE-913A-5B8191258157}"/>
+              </a:ext>
+            </a:extLst>
+          </p:cNvPr>
+          <p:cNvSpPr/>
+          <p:nvPr/>
+        </p:nvSpPr>
+        <p:spPr>
+          <a:xfrm rot="14507439">
+            <a:off x="2978205" y="1847850"/>
+            <a:ext cx="3162300" cy="3162300"/>
+          </a:xfrm>
+          <a:prstGeom prst="blockArc">
+            <a:avLst>
+              <a:gd name="adj1" fmla="val 10800000"/>
+              <a:gd name="adj2" fmla="val 16223790"/>
+              <a:gd name="adj3" fmla="val 6475"/>
+            </a:avLst>
+          </a:prstGeom>
+          <a:solidFill>
+            <a:schemeClr val="bg1"/>
+          </a:solidFill>
+          <a:ln>
+            <a:noFill/>
+          </a:ln>
+          <a:scene3d>
+            <a:camera prst="orthographicFront"/>
+            <a:lightRig rig="threePt" dir="t"/>
+          </a:scene3d>
+          <a:sp3d>
+            <a:bevelT w="190500"/>
+          </a:sp3d>
+        </p:spPr>
+        <p:style>
+          <a:lnRef idx="2">
+            <a:schemeClr val="accent1">
+              <a:shade val="50000"/>
+            </a:schemeClr>
+          </a:lnRef>
+          <a:fillRef idx="1">
+            <a:schemeClr val="accent1"/>
+          </a:fillRef>
+          <a:effectRef idx="0">
+            <a:schemeClr val="accent1"/>
+          </a:effectRef>
+          <a:fontRef idx="minor">
+            <a:schemeClr val="lt1"/>
+          </a:fontRef>
+        </p:style>
+        <p:txBody>
+          <a:bodyPr rtlCol="0" anchor="ctr"/>
+          <a:lstStyle/>
+          <a:p>
+            <a:pPr algn="ctr"/>
+            <a:endParaRPr lang="en-IN">
+              <a:solidFill>
+                <a:schemeClr val="tx1"/>
+              </a:solidFill>
+            </a:endParaRPr>
+          </a:p>
+        </p:txBody>
+      </p:sp>
+    </p:spTree>
+    <p:extLst>
+      <p:ext uri="{BB962C8B-B14F-4D97-AF65-F5344CB8AC3E}">
+        <p14:creationId xmlns:p14="http://schemas.microsoft.com/office/powerpoint/2010/main" val="4174535317"/>
+      </p:ext>
+    </p:extLst>
+  </p:cSld>
+  <p:clrMapOvr>
+    <a:masterClrMapping/>
+  </p:clrMapOvr>
+</p:sld>
+</file>
+
+<file path=ppt/slides/slide3.xml><?xml version="1.0" encoding="utf-8"?>
+<p:sld xmlns:a="http://schemas.openxmlformats.org/drawingml/2006/main" xmlns:r="http://schemas.openxmlformats.org/officeDocument/2006/relationships" xmlns:p="http://schemas.openxmlformats.org/presentationml/2006/main">
+  <p:cSld>
+    <p:bg>
+      <p:bgPr>
+        <a:solidFill>
+          <a:schemeClr val="bg1">
+            <a:lumMod val="75000"/>
+          </a:schemeClr>
+        </a:solidFill>
+        <a:effectLst/>
+      </p:bgPr>
+    </p:bg>
+    <p:spTree>
+      <p:nvGrpSpPr>
+        <p:cNvPr id="1" name=""/>
+        <p:cNvGrpSpPr/>
+        <p:nvPr/>
+      </p:nvGrpSpPr>
+      <p:grpSpPr>
+        <a:xfrm>
+          <a:off x="0" y="0"/>
+          <a:ext cx="0" cy="0"/>
+          <a:chOff x="0" y="0"/>
+          <a:chExt cx="0" cy="0"/>
+        </a:xfrm>
+      </p:grpSpPr>
+      <p:sp>
+        <p:nvSpPr>
+          <p:cNvPr id="7" name="Freeform: Shape 6">
+            <a:extLst>
+              <a:ext uri="{FF2B5EF4-FFF2-40B4-BE49-F238E27FC236}">
+                <a16:creationId xmlns:a16="http://schemas.microsoft.com/office/drawing/2014/main" id="{F165FF3A-79F0-4681-9C5F-D7BF753A653E}"/>
+              </a:ext>
+            </a:extLst>
+          </p:cNvPr>
+          <p:cNvSpPr/>
+          <p:nvPr/>
+        </p:nvSpPr>
+        <p:spPr>
+          <a:xfrm>
+            <a:off x="2752344" y="1609344"/>
+            <a:ext cx="3639312" cy="3639312"/>
+          </a:xfrm>
+          <a:custGeom>
+            <a:avLst/>
+            <a:gdLst>
+              <a:gd name="connsiteX0" fmla="*/ 1431050 w 3639312"/>
+              <a:gd name="connsiteY0" fmla="*/ 0 h 3639312"/>
+              <a:gd name="connsiteX1" fmla="*/ 2208262 w 3639312"/>
+              <a:gd name="connsiteY1" fmla="*/ 0 h 3639312"/>
+              <a:gd name="connsiteX2" fmla="*/ 2208262 w 3639312"/>
+              <a:gd name="connsiteY2" fmla="*/ 275572 h 3639312"/>
+              <a:gd name="connsiteX3" fmla="*/ 2293602 w 3639312"/>
+              <a:gd name="connsiteY3" fmla="*/ 297515 h 3639312"/>
+              <a:gd name="connsiteX4" fmla="*/ 3341797 w 3639312"/>
+              <a:gd name="connsiteY4" fmla="*/ 1345710 h 3639312"/>
+              <a:gd name="connsiteX5" fmla="*/ 3363741 w 3639312"/>
+              <a:gd name="connsiteY5" fmla="*/ 1431050 h 3639312"/>
+              <a:gd name="connsiteX6" fmla="*/ 3639312 w 3639312"/>
+              <a:gd name="connsiteY6" fmla="*/ 1431050 h 3639312"/>
+              <a:gd name="connsiteX7" fmla="*/ 3639312 w 3639312"/>
+              <a:gd name="connsiteY7" fmla="*/ 2208262 h 3639312"/>
+              <a:gd name="connsiteX8" fmla="*/ 3363741 w 3639312"/>
+              <a:gd name="connsiteY8" fmla="*/ 2208262 h 3639312"/>
+              <a:gd name="connsiteX9" fmla="*/ 3341797 w 3639312"/>
+              <a:gd name="connsiteY9" fmla="*/ 2293602 h 3639312"/>
+              <a:gd name="connsiteX10" fmla="*/ 2293602 w 3639312"/>
+              <a:gd name="connsiteY10" fmla="*/ 3341797 h 3639312"/>
+              <a:gd name="connsiteX11" fmla="*/ 2208262 w 3639312"/>
+              <a:gd name="connsiteY11" fmla="*/ 3363741 h 3639312"/>
+              <a:gd name="connsiteX12" fmla="*/ 2208262 w 3639312"/>
+              <a:gd name="connsiteY12" fmla="*/ 3639312 h 3639312"/>
+              <a:gd name="connsiteX13" fmla="*/ 1431050 w 3639312"/>
+              <a:gd name="connsiteY13" fmla="*/ 3639312 h 3639312"/>
+              <a:gd name="connsiteX14" fmla="*/ 1431050 w 3639312"/>
+              <a:gd name="connsiteY14" fmla="*/ 3363741 h 3639312"/>
+              <a:gd name="connsiteX15" fmla="*/ 1345710 w 3639312"/>
+              <a:gd name="connsiteY15" fmla="*/ 3341797 h 3639312"/>
+              <a:gd name="connsiteX16" fmla="*/ 297515 w 3639312"/>
+              <a:gd name="connsiteY16" fmla="*/ 2293602 h 3639312"/>
+              <a:gd name="connsiteX17" fmla="*/ 275572 w 3639312"/>
+              <a:gd name="connsiteY17" fmla="*/ 2208262 h 3639312"/>
+              <a:gd name="connsiteX18" fmla="*/ 0 w 3639312"/>
+              <a:gd name="connsiteY18" fmla="*/ 2208262 h 3639312"/>
+              <a:gd name="connsiteX19" fmla="*/ 0 w 3639312"/>
+              <a:gd name="connsiteY19" fmla="*/ 1431050 h 3639312"/>
+              <a:gd name="connsiteX20" fmla="*/ 275572 w 3639312"/>
+              <a:gd name="connsiteY20" fmla="*/ 1431050 h 3639312"/>
+              <a:gd name="connsiteX21" fmla="*/ 297515 w 3639312"/>
+              <a:gd name="connsiteY21" fmla="*/ 1345710 h 3639312"/>
+              <a:gd name="connsiteX22" fmla="*/ 1345710 w 3639312"/>
+              <a:gd name="connsiteY22" fmla="*/ 297515 h 3639312"/>
+              <a:gd name="connsiteX23" fmla="*/ 1431050 w 3639312"/>
+              <a:gd name="connsiteY23" fmla="*/ 275572 h 3639312"/>
+            </a:gdLst>
+            <a:ahLst/>
+            <a:cxnLst>
+              <a:cxn ang="0">
+                <a:pos x="connsiteX0" y="connsiteY0"/>
+              </a:cxn>
+              <a:cxn ang="0">
+                <a:pos x="connsiteX1" y="connsiteY1"/>
+              </a:cxn>
+              <a:cxn ang="0">
+                <a:pos x="connsiteX2" y="connsiteY2"/>
+              </a:cxn>
+              <a:cxn ang="0">
+                <a:pos x="connsiteX3" y="connsiteY3"/>
+              </a:cxn>
+              <a:cxn ang="0">
+                <a:pos x="connsiteX4" y="connsiteY4"/>
+              </a:cxn>
+              <a:cxn ang="0">
+                <a:pos x="connsiteX5" y="connsiteY5"/>
+              </a:cxn>
+              <a:cxn ang="0">
+                <a:pos x="connsiteX6" y="connsiteY6"/>
+              </a:cxn>
+              <a:cxn ang="0">
+                <a:pos x="connsiteX7" y="connsiteY7"/>
+              </a:cxn>
+              <a:cxn ang="0">
+                <a:pos x="connsiteX8" y="connsiteY8"/>
+              </a:cxn>
+              <a:cxn ang="0">
+                <a:pos x="connsiteX9" y="connsiteY9"/>
+              </a:cxn>
+              <a:cxn ang="0">
+                <a:pos x="connsiteX10" y="connsiteY10"/>
+              </a:cxn>
+              <a:cxn ang="0">
+                <a:pos x="connsiteX11" y="connsiteY11"/>
+              </a:cxn>
+              <a:cxn ang="0">
+                <a:pos x="connsiteX12" y="connsiteY12"/>
+              </a:cxn>
+              <a:cxn ang="0">
+                <a:pos x="connsiteX13" y="connsiteY13"/>
+              </a:cxn>
+              <a:cxn ang="0">
+                <a:pos x="connsiteX14" y="connsiteY14"/>
+              </a:cxn>
+              <a:cxn ang="0">
+                <a:pos x="connsiteX15" y="connsiteY15"/>
+              </a:cxn>
+              <a:cxn ang="0">
+                <a:pos x="connsiteX16" y="connsiteY16"/>
+              </a:cxn>
+              <a:cxn ang="0">
+                <a:pos x="connsiteX17" y="connsiteY17"/>
+              </a:cxn>
+              <a:cxn ang="0">
+                <a:pos x="connsiteX18" y="connsiteY18"/>
+              </a:cxn>
+              <a:cxn ang="0">
+                <a:pos x="connsiteX19" y="connsiteY19"/>
+              </a:cxn>
+              <a:cxn ang="0">
+                <a:pos x="connsiteX20" y="connsiteY20"/>
+              </a:cxn>
+              <a:cxn ang="0">
+                <a:pos x="connsiteX21" y="connsiteY21"/>
+              </a:cxn>
+              <a:cxn ang="0">
+                <a:pos x="connsiteX22" y="connsiteY22"/>
+              </a:cxn>
+              <a:cxn ang="0">
+                <a:pos x="connsiteX23" y="connsiteY23"/>
+              </a:cxn>
+            </a:cxnLst>
+            <a:rect l="l" t="t" r="r" b="b"/>
+            <a:pathLst>
+              <a:path w="3639312" h="3639312">
+                <a:moveTo>
+                  <a:pt x="1431050" y="0"/>
+                </a:moveTo>
+                <a:lnTo>
+                  <a:pt x="2208262" y="0"/>
+                </a:lnTo>
+                <a:lnTo>
+                  <a:pt x="2208262" y="275572"/>
+                </a:lnTo>
+                <a:lnTo>
+                  <a:pt x="2293602" y="297515"/>
+                </a:lnTo>
+                <a:cubicBezTo>
+                  <a:pt x="2792667" y="452740"/>
+                  <a:pt x="3186572" y="846646"/>
+                  <a:pt x="3341797" y="1345710"/>
+                </a:cubicBezTo>
+                <a:lnTo>
+                  <a:pt x="3363741" y="1431050"/>
+                </a:lnTo>
+                <a:lnTo>
+                  <a:pt x="3639312" y="1431050"/>
+                </a:lnTo>
+                <a:lnTo>
+                  <a:pt x="3639312" y="2208262"/>
+                </a:lnTo>
+                <a:lnTo>
+                  <a:pt x="3363741" y="2208262"/>
+                </a:lnTo>
+                <a:lnTo>
+                  <a:pt x="3341797" y="2293602"/>
+                </a:lnTo>
+                <a:cubicBezTo>
+                  <a:pt x="3186572" y="2792667"/>
+                  <a:pt x="2792667" y="3186572"/>
+                  <a:pt x="2293602" y="3341797"/>
+                </a:cubicBezTo>
+                <a:lnTo>
+                  <a:pt x="2208262" y="3363741"/>
+                </a:lnTo>
+                <a:lnTo>
+                  <a:pt x="2208262" y="3639312"/>
+                </a:lnTo>
+                <a:lnTo>
+                  <a:pt x="1431050" y="3639312"/>
+                </a:lnTo>
+                <a:lnTo>
+                  <a:pt x="1431050" y="3363741"/>
+                </a:lnTo>
+                <a:lnTo>
+                  <a:pt x="1345710" y="3341797"/>
+                </a:lnTo>
+                <a:cubicBezTo>
+                  <a:pt x="846646" y="3186572"/>
+                  <a:pt x="452740" y="2792667"/>
+                  <a:pt x="297515" y="2293602"/>
+                </a:cubicBezTo>
+                <a:lnTo>
+                  <a:pt x="275572" y="2208262"/>
+                </a:lnTo>
+                <a:lnTo>
+                  <a:pt x="0" y="2208262"/>
+                </a:lnTo>
+                <a:lnTo>
+                  <a:pt x="0" y="1431050"/>
+                </a:lnTo>
+                <a:lnTo>
+                  <a:pt x="275572" y="1431050"/>
+                </a:lnTo>
+                <a:lnTo>
+                  <a:pt x="297515" y="1345710"/>
+                </a:lnTo>
+                <a:cubicBezTo>
+                  <a:pt x="452740" y="846646"/>
+                  <a:pt x="846646" y="452740"/>
+                  <a:pt x="1345710" y="297515"/>
+                </a:cubicBezTo>
+                <a:lnTo>
+                  <a:pt x="1431050" y="275572"/>
+                </a:lnTo>
+                <a:close/>
+              </a:path>
+            </a:pathLst>
+          </a:custGeom>
+          <a:gradFill flip="none" rotWithShape="1">
+            <a:gsLst>
+              <a:gs pos="31000">
+                <a:srgbClr val="F9FBFD">
+                  <a:alpha val="0"/>
+                </a:srgbClr>
+              </a:gs>
+              <a:gs pos="0">
+                <a:srgbClr val="F6F9FC">
+                  <a:alpha val="0"/>
+                </a:srgbClr>
+              </a:gs>
+              <a:gs pos="100000">
+                <a:schemeClr val="bg1"/>
+              </a:gs>
+            </a:gsLst>
+            <a:path path="circle">
+              <a:fillToRect l="50000" t="50000" r="50000" b="50000"/>
+            </a:path>
+            <a:tileRect/>
+          </a:gradFill>
+          <a:ln w="76200">
+            <a:solidFill>
+              <a:schemeClr val="bg1"/>
+            </a:solidFill>
+          </a:ln>
+        </p:spPr>
+        <p:style>
+          <a:lnRef idx="2">
+            <a:schemeClr val="accent1">
+              <a:shade val="50000"/>
+            </a:schemeClr>
+          </a:lnRef>
+          <a:fillRef idx="1">
+            <a:schemeClr val="accent1"/>
+          </a:fillRef>
+          <a:effectRef idx="0">
+            <a:schemeClr val="accent1"/>
+          </a:effectRef>
+          <a:fontRef idx="minor">
+            <a:schemeClr val="lt1"/>
+          </a:fontRef>
+        </p:style>
+        <p:txBody>
+          <a:bodyPr wrap="square" rtlCol="0" anchor="ctr">
+            <a:noAutofit/>
+          </a:bodyPr>
+          <a:lstStyle/>
+          <a:p>
+            <a:pPr algn="ctr"/>
+            <a:endParaRPr lang="en-IN"/>
+          </a:p>
+        </p:txBody>
+      </p:sp>
+    </p:spTree>
+    <p:extLst>
+      <p:ext uri="{BB962C8B-B14F-4D97-AF65-F5344CB8AC3E}">
+        <p14:creationId xmlns:p14="http://schemas.microsoft.com/office/powerpoint/2010/main" val="2273870543"/>
+      </p:ext>
+    </p:extLst>
+  </p:cSld>
+  <p:clrMapOvr>
+    <a:masterClrMapping/>
+  </p:clrMapOvr>
+</p:sld>
+</file>
+
+<file path=ppt/slides/slide4.xml><?xml version="1.0" encoding="utf-8"?>
+<p:sld xmlns:a="http://schemas.openxmlformats.org/drawingml/2006/main" xmlns:r="http://schemas.openxmlformats.org/officeDocument/2006/relationships" xmlns:p="http://schemas.openxmlformats.org/presentationml/2006/main">
+  <p:cSld>
+    <p:bg>
+      <p:bgPr>
+        <a:solidFill>
+          <a:schemeClr val="bg1">
+            <a:lumMod val="75000"/>
+          </a:schemeClr>
+        </a:solidFill>
+        <a:effectLst/>
+      </p:bgPr>
+    </p:bg>
+    <p:spTree>
+      <p:nvGrpSpPr>
+        <p:cNvPr id="1" name=""/>
+        <p:cNvGrpSpPr/>
+        <p:nvPr/>
+      </p:nvGrpSpPr>
+      <p:grpSpPr>
+        <a:xfrm>
+          <a:off x="0" y="0"/>
+          <a:ext cx="0" cy="0"/>
+          <a:chOff x="0" y="0"/>
+          <a:chExt cx="0" cy="0"/>
+        </a:xfrm>
+      </p:grpSpPr>
+      <p:sp>
+        <p:nvSpPr>
+          <p:cNvPr id="4" name="Rounded Rectangle 3"/>
+          <p:cNvSpPr/>
+          <p:nvPr/>
+        </p:nvSpPr>
+        <p:spPr>
+          <a:xfrm>
+            <a:off x="2705100" y="3162300"/>
+            <a:ext cx="3733800" cy="533400"/>
+          </a:xfrm>
+          <a:prstGeom prst="roundRect">
+            <a:avLst>
+              <a:gd name="adj" fmla="val 23661"/>
+            </a:avLst>
+          </a:prstGeom>
+          <a:solidFill>
+            <a:srgbClr val="FFFFFF">
+              <a:alpha val="27059"/>
+            </a:srgbClr>
+          </a:solidFill>
+          <a:ln>
+            <a:solidFill>
+              <a:schemeClr val="bg1"/>
+            </a:solidFill>
+          </a:ln>
+        </p:spPr>
+        <p:style>
+          <a:lnRef idx="2">
+            <a:schemeClr val="accent1">
+              <a:shade val="50000"/>
+            </a:schemeClr>
+          </a:lnRef>
+          <a:fillRef idx="1">
+            <a:schemeClr val="accent1"/>
+          </a:fillRef>
+          <a:effectRef idx="0">
+            <a:schemeClr val="accent1"/>
+          </a:effectRef>
+          <a:fontRef idx="minor">
+            <a:schemeClr val="lt1"/>
+          </a:fontRef>
+        </p:style>
+        <p:txBody>
+          <a:bodyPr rtlCol="0" anchor="ctr"/>
+          <a:lstStyle/>
+          <a:p>
+            <a:pPr algn="ctr"/>
+            <a:endParaRPr lang="en-US"/>
+          </a:p>
+        </p:txBody>
+      </p:sp>
+      <p:sp>
+        <p:nvSpPr>
+          <p:cNvPr id="5" name="Rounded Rectangle 4"/>
+          <p:cNvSpPr/>
+          <p:nvPr/>
+        </p:nvSpPr>
+        <p:spPr>
+          <a:xfrm>
+            <a:off x="2763830" y="2594155"/>
+            <a:ext cx="3675070" cy="487910"/>
+          </a:xfrm>
+          <a:prstGeom prst="roundRect">
+            <a:avLst>
+              <a:gd name="adj" fmla="val 22669"/>
+            </a:avLst>
+          </a:prstGeom>
+          <a:solidFill>
+            <a:schemeClr val="bg1"/>
+          </a:solidFill>
+          <a:ln>
+            <a:noFill/>
+          </a:ln>
+        </p:spPr>
+        <p:style>
+          <a:lnRef idx="2">
+            <a:schemeClr val="accent1">
+              <a:shade val="50000"/>
+            </a:schemeClr>
+          </a:lnRef>
+          <a:fillRef idx="1">
+            <a:schemeClr val="accent1"/>
+          </a:fillRef>
+          <a:effectRef idx="0">
+            <a:schemeClr val="accent1"/>
+          </a:effectRef>
+          <a:fontRef idx="minor">
+            <a:schemeClr val="lt1"/>
+          </a:fontRef>
+        </p:style>
+        <p:txBody>
+          <a:bodyPr rtlCol="0" anchor="ctr"/>
+          <a:lstStyle/>
+          <a:p>
+            <a:pPr algn="ctr"/>
+            <a:endParaRPr lang="en-US"/>
+          </a:p>
+        </p:txBody>
+      </p:sp>
+    </p:spTree>
+    <p:extLst>
+      <p:ext uri="{BB962C8B-B14F-4D97-AF65-F5344CB8AC3E}">
+        <p14:creationId xmlns:p14="http://schemas.microsoft.com/office/powerpoint/2010/main" val="2921418593"/>
+      </p:ext>
+    </p:extLst>
+  </p:cSld>
+  <p:clrMapOvr>
+    <a:masterClrMapping/>
+  </p:clrMapOvr>
+</p:sld>
+</file>
+
+<file path=ppt/slides/slide5.xml><?xml version="1.0" encoding="utf-8"?>
+<p:sld xmlns:a="http://schemas.openxmlformats.org/drawingml/2006/main" xmlns:r="http://schemas.openxmlformats.org/officeDocument/2006/relationships" xmlns:p="http://schemas.openxmlformats.org/presentationml/2006/main">
+  <p:cSld>
+    <p:bg>
+      <p:bgPr>
+        <a:solidFill>
+          <a:schemeClr val="bg1">
+            <a:lumMod val="75000"/>
+          </a:schemeClr>
+        </a:solidFill>
+        <a:effectLst/>
+      </p:bgPr>
+    </p:bg>
+    <p:spTree>
+      <p:nvGrpSpPr>
+        <p:cNvPr id="1" name=""/>
+        <p:cNvGrpSpPr/>
+        <p:nvPr/>
+      </p:nvGrpSpPr>
+      <p:grpSpPr>
+        <a:xfrm>
+          <a:off x="0" y="0"/>
+          <a:ext cx="0" cy="0"/>
+          <a:chOff x="0" y="0"/>
+          <a:chExt cx="0" cy="0"/>
+        </a:xfrm>
+      </p:grpSpPr>
+      <p:sp>
+        <p:nvSpPr>
+          <p:cNvPr id="5" name="Oval 4">
+            <a:extLst>
+              <a:ext uri="{FF2B5EF4-FFF2-40B4-BE49-F238E27FC236}">
+                <a16:creationId xmlns:a16="http://schemas.microsoft.com/office/drawing/2014/main" id="{5CE85C29-C9E0-4DC2-9692-A83A4E8ECB26}"/>
+              </a:ext>
+            </a:extLst>
+          </p:cNvPr>
           <p:cNvSpPr/>
           <p:nvPr/>
         </p:nvSpPr>
@@ -3225,12 +3999,27 @@
           <a:prstGeom prst="ellipse">
             <a:avLst/>
           </a:prstGeom>
-          <a:solidFill>
-            <a:srgbClr val="FFFFFF">
-              <a:alpha val="50196"/>
-            </a:srgbClr>
-          </a:solidFill>
-          <a:ln w="76200">
+          <a:gradFill>
+            <a:gsLst>
+              <a:gs pos="31000">
+                <a:srgbClr val="F9FBFD">
+                  <a:alpha val="0"/>
+                </a:srgbClr>
+              </a:gs>
+              <a:gs pos="0">
+                <a:srgbClr val="F6F9FC">
+                  <a:alpha val="0"/>
+                </a:srgbClr>
+              </a:gs>
+              <a:gs pos="100000">
+                <a:schemeClr val="bg1"/>
+              </a:gs>
+            </a:gsLst>
+            <a:path path="circle">
+              <a:fillToRect l="50000" t="50000" r="50000" b="50000"/>
+            </a:path>
+          </a:gradFill>
+          <a:ln w="101600">
             <a:solidFill>
               <a:srgbClr val="FFFFFF"/>
             </a:solidFill>
@@ -3257,7 +4046,63 @@
           <a:lstStyle/>
           <a:p>
             <a:pPr algn="ctr"/>
-            <a:endParaRPr lang="en-US"/>
+            <a:endParaRPr lang="en-US" dirty="0"/>
+          </a:p>
+        </p:txBody>
+      </p:sp>
+      <p:sp>
+        <p:nvSpPr>
+          <p:cNvPr id="8" name="Oval 7">
+            <a:extLst>
+              <a:ext uri="{FF2B5EF4-FFF2-40B4-BE49-F238E27FC236}">
+                <a16:creationId xmlns:a16="http://schemas.microsoft.com/office/drawing/2014/main" id="{5725AE3B-260D-4152-B42C-402374412E31}"/>
+              </a:ext>
+            </a:extLst>
+          </p:cNvPr>
+          <p:cNvSpPr/>
+          <p:nvPr/>
+        </p:nvSpPr>
+        <p:spPr>
+          <a:xfrm>
+            <a:off x="170090" y="261680"/>
+            <a:ext cx="3187590" cy="3187590"/>
+          </a:xfrm>
+          <a:prstGeom prst="ellipse">
+            <a:avLst/>
+          </a:prstGeom>
+          <a:solidFill>
+            <a:srgbClr val="FFFFFF">
+              <a:alpha val="50196"/>
+            </a:srgbClr>
+          </a:solidFill>
+          <a:ln w="101600">
+            <a:solidFill>
+              <a:srgbClr val="FFFFFF"/>
+            </a:solidFill>
+          </a:ln>
+        </p:spPr>
+        <p:style>
+          <a:lnRef idx="2">
+            <a:schemeClr val="accent1">
+              <a:shade val="50000"/>
+            </a:schemeClr>
+          </a:lnRef>
+          <a:fillRef idx="1">
+            <a:schemeClr val="accent1"/>
+          </a:fillRef>
+          <a:effectRef idx="0">
+            <a:schemeClr val="accent1"/>
+          </a:effectRef>
+          <a:fontRef idx="minor">
+            <a:schemeClr val="lt1"/>
+          </a:fontRef>
+        </p:style>
+        <p:txBody>
+          <a:bodyPr rtlCol="0" anchor="ctr"/>
+          <a:lstStyle/>
+          <a:p>
+            <a:pPr algn="ctr"/>
+            <a:endParaRPr lang="en-US" dirty="0"/>
           </a:p>
         </p:txBody>
       </p:sp>
@@ -3274,7 +4119,1157 @@
 </p:sld>
 </file>
 
-<file path=ppt/slides/slide3.xml><?xml version="1.0" encoding="utf-8"?>
+<file path=ppt/slides/slide6.xml><?xml version="1.0" encoding="utf-8"?>
+<p:sld xmlns:a="http://schemas.openxmlformats.org/drawingml/2006/main" xmlns:r="http://schemas.openxmlformats.org/officeDocument/2006/relationships" xmlns:p="http://schemas.openxmlformats.org/presentationml/2006/main">
+  <p:cSld>
+    <p:bg>
+      <p:bgPr>
+        <a:solidFill>
+          <a:schemeClr val="tx1"/>
+        </a:solidFill>
+        <a:effectLst/>
+      </p:bgPr>
+    </p:bg>
+    <p:spTree>
+      <p:nvGrpSpPr>
+        <p:cNvPr id="1" name=""/>
+        <p:cNvGrpSpPr/>
+        <p:nvPr/>
+      </p:nvGrpSpPr>
+      <p:grpSpPr>
+        <a:xfrm>
+          <a:off x="0" y="0"/>
+          <a:ext cx="0" cy="0"/>
+          <a:chOff x="0" y="0"/>
+          <a:chExt cx="0" cy="0"/>
+        </a:xfrm>
+      </p:grpSpPr>
+      <p:pic>
+        <p:nvPicPr>
+          <p:cNvPr id="1026" name="Picture 2" descr="Archero 1.4.3 APK Download">
+            <a:extLst>
+              <a:ext uri="{FF2B5EF4-FFF2-40B4-BE49-F238E27FC236}">
+                <a16:creationId xmlns:a16="http://schemas.microsoft.com/office/drawing/2014/main" id="{6B6FC3BB-24B5-40E9-8988-16CDA19AEE96}"/>
+              </a:ext>
+            </a:extLst>
+          </p:cNvPr>
+          <p:cNvPicPr>
+            <a:picLocks noChangeAspect="1" noChangeArrowheads="1"/>
+          </p:cNvPicPr>
+          <p:nvPr/>
+        </p:nvPicPr>
+        <p:blipFill rotWithShape="1">
+          <a:blip r:embed="rId2">
+            <a:extLst>
+              <a:ext uri="{28A0092B-C50C-407E-A947-70E740481C1C}">
+                <a14:useLocalDpi xmlns:a14="http://schemas.microsoft.com/office/drawing/2010/main" val="0"/>
+              </a:ext>
+            </a:extLst>
+          </a:blip>
+          <a:srcRect l="27521" t="73041" r="29232" b="2612"/>
+          <a:stretch/>
+        </p:blipFill>
+        <p:spPr bwMode="auto">
+          <a:xfrm>
+            <a:off x="-4940611" y="981398"/>
+            <a:ext cx="4979822" cy="4979822"/>
+          </a:xfrm>
+          <a:prstGeom prst="rect">
+            <a:avLst/>
+          </a:prstGeom>
+          <a:noFill/>
+          <a:extLst>
+            <a:ext uri="{909E8E84-426E-40DD-AFC4-6F175D3DCCD1}">
+              <a14:hiddenFill xmlns:a14="http://schemas.microsoft.com/office/drawing/2010/main">
+                <a:solidFill>
+                  <a:srgbClr val="FFFFFF"/>
+                </a:solidFill>
+              </a14:hiddenFill>
+            </a:ext>
+          </a:extLst>
+        </p:spPr>
+      </p:pic>
+      <p:sp>
+        <p:nvSpPr>
+          <p:cNvPr id="2" name="Circle: Hollow 1">
+            <a:extLst>
+              <a:ext uri="{FF2B5EF4-FFF2-40B4-BE49-F238E27FC236}">
+                <a16:creationId xmlns:a16="http://schemas.microsoft.com/office/drawing/2014/main" id="{62C64EB0-7A2B-4828-BDBB-E82B485700F5}"/>
+              </a:ext>
+            </a:extLst>
+          </p:cNvPr>
+          <p:cNvSpPr/>
+          <p:nvPr/>
+        </p:nvSpPr>
+        <p:spPr>
+          <a:xfrm>
+            <a:off x="2276856" y="1133856"/>
+            <a:ext cx="4590288" cy="4590288"/>
+          </a:xfrm>
+          <a:prstGeom prst="donut">
+            <a:avLst>
+              <a:gd name="adj" fmla="val 3878"/>
+            </a:avLst>
+          </a:prstGeom>
+          <a:solidFill>
+            <a:schemeClr val="bg1">
+              <a:alpha val="80000"/>
+            </a:schemeClr>
+          </a:solidFill>
+          <a:ln>
+            <a:noFill/>
+          </a:ln>
+        </p:spPr>
+        <p:style>
+          <a:lnRef idx="2">
+            <a:schemeClr val="accent1">
+              <a:shade val="50000"/>
+            </a:schemeClr>
+          </a:lnRef>
+          <a:fillRef idx="1">
+            <a:schemeClr val="accent1"/>
+          </a:fillRef>
+          <a:effectRef idx="0">
+            <a:schemeClr val="accent1"/>
+          </a:effectRef>
+          <a:fontRef idx="minor">
+            <a:schemeClr val="lt1"/>
+          </a:fontRef>
+        </p:style>
+        <p:txBody>
+          <a:bodyPr rtlCol="0" anchor="ctr"/>
+          <a:lstStyle/>
+          <a:p>
+            <a:pPr algn="ctr"/>
+            <a:endParaRPr lang="en-IN">
+              <a:solidFill>
+                <a:schemeClr val="tx1"/>
+              </a:solidFill>
+            </a:endParaRPr>
+          </a:p>
+        </p:txBody>
+      </p:sp>
+      <p:sp>
+        <p:nvSpPr>
+          <p:cNvPr id="17" name="Freeform: Shape 16">
+            <a:extLst>
+              <a:ext uri="{FF2B5EF4-FFF2-40B4-BE49-F238E27FC236}">
+                <a16:creationId xmlns:a16="http://schemas.microsoft.com/office/drawing/2014/main" id="{013B213B-B3A8-46BD-8505-858079DC669A}"/>
+              </a:ext>
+            </a:extLst>
+          </p:cNvPr>
+          <p:cNvSpPr/>
+          <p:nvPr/>
+        </p:nvSpPr>
+        <p:spPr>
+          <a:xfrm rot="2700000">
+            <a:off x="2578607" y="1435608"/>
+            <a:ext cx="3986784" cy="3986784"/>
+          </a:xfrm>
+          <a:custGeom>
+            <a:avLst/>
+            <a:gdLst>
+              <a:gd name="connsiteX0" fmla="*/ 2449985 w 3986784"/>
+              <a:gd name="connsiteY0" fmla="*/ 3250231 h 3986784"/>
+              <a:gd name="connsiteX1" fmla="*/ 3254974 w 3986784"/>
+              <a:gd name="connsiteY1" fmla="*/ 3250230 h 3986784"/>
+              <a:gd name="connsiteX2" fmla="*/ 3254974 w 3986784"/>
+              <a:gd name="connsiteY2" fmla="*/ 2445242 h 3986784"/>
+              <a:gd name="connsiteX3" fmla="*/ 3105745 w 3986784"/>
+              <a:gd name="connsiteY3" fmla="*/ 2594471 h 3986784"/>
+              <a:gd name="connsiteX4" fmla="*/ 3105745 w 3986784"/>
+              <a:gd name="connsiteY4" fmla="*/ 3087912 h 3986784"/>
+              <a:gd name="connsiteX5" fmla="*/ 2612303 w 3986784"/>
+              <a:gd name="connsiteY5" fmla="*/ 3087913 h 3986784"/>
+              <a:gd name="connsiteX6" fmla="*/ 2459089 w 3986784"/>
+              <a:gd name="connsiteY6" fmla="*/ 776373 h 3986784"/>
+              <a:gd name="connsiteX7" fmla="*/ 2608319 w 3986784"/>
+              <a:gd name="connsiteY7" fmla="*/ 925602 h 3986784"/>
+              <a:gd name="connsiteX8" fmla="*/ 3101760 w 3986784"/>
+              <a:gd name="connsiteY8" fmla="*/ 925603 h 3986784"/>
+              <a:gd name="connsiteX9" fmla="*/ 3101760 w 3986784"/>
+              <a:gd name="connsiteY9" fmla="*/ 1419044 h 3986784"/>
+              <a:gd name="connsiteX10" fmla="*/ 3264079 w 3986784"/>
+              <a:gd name="connsiteY10" fmla="*/ 1581362 h 3986784"/>
+              <a:gd name="connsiteX11" fmla="*/ 3264078 w 3986784"/>
+              <a:gd name="connsiteY11" fmla="*/ 776374 h 3986784"/>
+              <a:gd name="connsiteX12" fmla="*/ 788122 w 3986784"/>
+              <a:gd name="connsiteY12" fmla="*/ 2419533 h 3986784"/>
+              <a:gd name="connsiteX13" fmla="*/ 788122 w 3986784"/>
+              <a:gd name="connsiteY13" fmla="*/ 3224522 h 3986784"/>
+              <a:gd name="connsiteX14" fmla="*/ 1593111 w 3986784"/>
+              <a:gd name="connsiteY14" fmla="*/ 3224522 h 3986784"/>
+              <a:gd name="connsiteX15" fmla="*/ 1443882 w 3986784"/>
+              <a:gd name="connsiteY15" fmla="*/ 3075293 h 3986784"/>
+              <a:gd name="connsiteX16" fmla="*/ 950440 w 3986784"/>
+              <a:gd name="connsiteY16" fmla="*/ 3075293 h 3986784"/>
+              <a:gd name="connsiteX17" fmla="*/ 950440 w 3986784"/>
+              <a:gd name="connsiteY17" fmla="*/ 2581851 h 3986784"/>
+              <a:gd name="connsiteX18" fmla="*/ 812742 w 3986784"/>
+              <a:gd name="connsiteY18" fmla="*/ 812742 h 3986784"/>
+              <a:gd name="connsiteX19" fmla="*/ 812742 w 3986784"/>
+              <a:gd name="connsiteY19" fmla="*/ 1617731 h 3986784"/>
+              <a:gd name="connsiteX20" fmla="*/ 961971 w 3986784"/>
+              <a:gd name="connsiteY20" fmla="*/ 1468502 h 3986784"/>
+              <a:gd name="connsiteX21" fmla="*/ 961971 w 3986784"/>
+              <a:gd name="connsiteY21" fmla="*/ 975060 h 3986784"/>
+              <a:gd name="connsiteX22" fmla="*/ 1455413 w 3986784"/>
+              <a:gd name="connsiteY22" fmla="*/ 975060 h 3986784"/>
+              <a:gd name="connsiteX23" fmla="*/ 1617731 w 3986784"/>
+              <a:gd name="connsiteY23" fmla="*/ 812742 h 3986784"/>
+              <a:gd name="connsiteX24" fmla="*/ 583851 w 3986784"/>
+              <a:gd name="connsiteY24" fmla="*/ 583851 h 3986784"/>
+              <a:gd name="connsiteX25" fmla="*/ 3402933 w 3986784"/>
+              <a:gd name="connsiteY25" fmla="*/ 583851 h 3986784"/>
+              <a:gd name="connsiteX26" fmla="*/ 3402933 w 3986784"/>
+              <a:gd name="connsiteY26" fmla="*/ 3402933 h 3986784"/>
+              <a:gd name="connsiteX27" fmla="*/ 583851 w 3986784"/>
+              <a:gd name="connsiteY27" fmla="*/ 3402933 h 3986784"/>
+              <a:gd name="connsiteX28" fmla="*/ 583851 w 3986784"/>
+              <a:gd name="connsiteY28" fmla="*/ 583851 h 3986784"/>
+            </a:gdLst>
+            <a:ahLst/>
+            <a:cxnLst>
+              <a:cxn ang="0">
+                <a:pos x="connsiteX0" y="connsiteY0"/>
+              </a:cxn>
+              <a:cxn ang="0">
+                <a:pos x="connsiteX1" y="connsiteY1"/>
+              </a:cxn>
+              <a:cxn ang="0">
+                <a:pos x="connsiteX2" y="connsiteY2"/>
+              </a:cxn>
+              <a:cxn ang="0">
+                <a:pos x="connsiteX3" y="connsiteY3"/>
+              </a:cxn>
+              <a:cxn ang="0">
+                <a:pos x="connsiteX4" y="connsiteY4"/>
+              </a:cxn>
+              <a:cxn ang="0">
+                <a:pos x="connsiteX5" y="connsiteY5"/>
+              </a:cxn>
+              <a:cxn ang="0">
+                <a:pos x="connsiteX6" y="connsiteY6"/>
+              </a:cxn>
+              <a:cxn ang="0">
+                <a:pos x="connsiteX7" y="connsiteY7"/>
+              </a:cxn>
+              <a:cxn ang="0">
+                <a:pos x="connsiteX8" y="connsiteY8"/>
+              </a:cxn>
+              <a:cxn ang="0">
+                <a:pos x="connsiteX9" y="connsiteY9"/>
+              </a:cxn>
+              <a:cxn ang="0">
+                <a:pos x="connsiteX10" y="connsiteY10"/>
+              </a:cxn>
+              <a:cxn ang="0">
+                <a:pos x="connsiteX11" y="connsiteY11"/>
+              </a:cxn>
+              <a:cxn ang="0">
+                <a:pos x="connsiteX12" y="connsiteY12"/>
+              </a:cxn>
+              <a:cxn ang="0">
+                <a:pos x="connsiteX13" y="connsiteY13"/>
+              </a:cxn>
+              <a:cxn ang="0">
+                <a:pos x="connsiteX14" y="connsiteY14"/>
+              </a:cxn>
+              <a:cxn ang="0">
+                <a:pos x="connsiteX15" y="connsiteY15"/>
+              </a:cxn>
+              <a:cxn ang="0">
+                <a:pos x="connsiteX16" y="connsiteY16"/>
+              </a:cxn>
+              <a:cxn ang="0">
+                <a:pos x="connsiteX17" y="connsiteY17"/>
+              </a:cxn>
+              <a:cxn ang="0">
+                <a:pos x="connsiteX18" y="connsiteY18"/>
+              </a:cxn>
+              <a:cxn ang="0">
+                <a:pos x="connsiteX19" y="connsiteY19"/>
+              </a:cxn>
+              <a:cxn ang="0">
+                <a:pos x="connsiteX20" y="connsiteY20"/>
+              </a:cxn>
+              <a:cxn ang="0">
+                <a:pos x="connsiteX21" y="connsiteY21"/>
+              </a:cxn>
+              <a:cxn ang="0">
+                <a:pos x="connsiteX22" y="connsiteY22"/>
+              </a:cxn>
+              <a:cxn ang="0">
+                <a:pos x="connsiteX23" y="connsiteY23"/>
+              </a:cxn>
+              <a:cxn ang="0">
+                <a:pos x="connsiteX24" y="connsiteY24"/>
+              </a:cxn>
+              <a:cxn ang="0">
+                <a:pos x="connsiteX25" y="connsiteY25"/>
+              </a:cxn>
+              <a:cxn ang="0">
+                <a:pos x="connsiteX26" y="connsiteY26"/>
+              </a:cxn>
+              <a:cxn ang="0">
+                <a:pos x="connsiteX27" y="connsiteY27"/>
+              </a:cxn>
+              <a:cxn ang="0">
+                <a:pos x="connsiteX28" y="connsiteY28"/>
+              </a:cxn>
+            </a:cxnLst>
+            <a:rect l="l" t="t" r="r" b="b"/>
+            <a:pathLst>
+              <a:path w="3986784" h="3986784">
+                <a:moveTo>
+                  <a:pt x="2449985" y="3250231"/>
+                </a:moveTo>
+                <a:lnTo>
+                  <a:pt x="3254974" y="3250230"/>
+                </a:lnTo>
+                <a:lnTo>
+                  <a:pt x="3254974" y="2445242"/>
+                </a:lnTo>
+                <a:lnTo>
+                  <a:pt x="3105745" y="2594471"/>
+                </a:lnTo>
+                <a:lnTo>
+                  <a:pt x="3105745" y="3087912"/>
+                </a:lnTo>
+                <a:lnTo>
+                  <a:pt x="2612303" y="3087913"/>
+                </a:lnTo>
+                <a:close/>
+                <a:moveTo>
+                  <a:pt x="2459089" y="776373"/>
+                </a:moveTo>
+                <a:lnTo>
+                  <a:pt x="2608319" y="925602"/>
+                </a:lnTo>
+                <a:lnTo>
+                  <a:pt x="3101760" y="925603"/>
+                </a:lnTo>
+                <a:lnTo>
+                  <a:pt x="3101760" y="1419044"/>
+                </a:lnTo>
+                <a:lnTo>
+                  <a:pt x="3264079" y="1581362"/>
+                </a:lnTo>
+                <a:lnTo>
+                  <a:pt x="3264078" y="776374"/>
+                </a:lnTo>
+                <a:close/>
+                <a:moveTo>
+                  <a:pt x="788122" y="2419533"/>
+                </a:moveTo>
+                <a:lnTo>
+                  <a:pt x="788122" y="3224522"/>
+                </a:lnTo>
+                <a:lnTo>
+                  <a:pt x="1593111" y="3224522"/>
+                </a:lnTo>
+                <a:lnTo>
+                  <a:pt x="1443882" y="3075293"/>
+                </a:lnTo>
+                <a:lnTo>
+                  <a:pt x="950440" y="3075293"/>
+                </a:lnTo>
+                <a:lnTo>
+                  <a:pt x="950440" y="2581851"/>
+                </a:lnTo>
+                <a:close/>
+                <a:moveTo>
+                  <a:pt x="812742" y="812742"/>
+                </a:moveTo>
+                <a:lnTo>
+                  <a:pt x="812742" y="1617731"/>
+                </a:lnTo>
+                <a:lnTo>
+                  <a:pt x="961971" y="1468502"/>
+                </a:lnTo>
+                <a:lnTo>
+                  <a:pt x="961971" y="975060"/>
+                </a:lnTo>
+                <a:lnTo>
+                  <a:pt x="1455413" y="975060"/>
+                </a:lnTo>
+                <a:lnTo>
+                  <a:pt x="1617731" y="812742"/>
+                </a:lnTo>
+                <a:close/>
+                <a:moveTo>
+                  <a:pt x="583851" y="583851"/>
+                </a:moveTo>
+                <a:cubicBezTo>
+                  <a:pt x="1362319" y="-194617"/>
+                  <a:pt x="2624465" y="-194617"/>
+                  <a:pt x="3402933" y="583851"/>
+                </a:cubicBezTo>
+                <a:cubicBezTo>
+                  <a:pt x="4181401" y="1362319"/>
+                  <a:pt x="4181401" y="2624465"/>
+                  <a:pt x="3402933" y="3402933"/>
+                </a:cubicBezTo>
+                <a:cubicBezTo>
+                  <a:pt x="2624465" y="4181401"/>
+                  <a:pt x="1362319" y="4181401"/>
+                  <a:pt x="583851" y="3402933"/>
+                </a:cubicBezTo>
+                <a:cubicBezTo>
+                  <a:pt x="-194617" y="2624465"/>
+                  <a:pt x="-194617" y="1362319"/>
+                  <a:pt x="583851" y="583851"/>
+                </a:cubicBezTo>
+                <a:close/>
+              </a:path>
+            </a:pathLst>
+          </a:custGeom>
+          <a:gradFill>
+            <a:gsLst>
+              <a:gs pos="0">
+                <a:schemeClr val="accent1">
+                  <a:lumMod val="0"/>
+                  <a:lumOff val="100000"/>
+                  <a:alpha val="0"/>
+                </a:schemeClr>
+              </a:gs>
+              <a:gs pos="74000">
+                <a:srgbClr val="FFFFFF">
+                  <a:alpha val="80000"/>
+                </a:srgbClr>
+              </a:gs>
+            </a:gsLst>
+            <a:path path="circle">
+              <a:fillToRect l="50000" t="50000" r="50000" b="50000"/>
+            </a:path>
+          </a:gradFill>
+          <a:ln>
+            <a:noFill/>
+          </a:ln>
+        </p:spPr>
+        <p:style>
+          <a:lnRef idx="2">
+            <a:schemeClr val="accent1">
+              <a:shade val="50000"/>
+            </a:schemeClr>
+          </a:lnRef>
+          <a:fillRef idx="1">
+            <a:schemeClr val="accent1"/>
+          </a:fillRef>
+          <a:effectRef idx="0">
+            <a:schemeClr val="accent1"/>
+          </a:effectRef>
+          <a:fontRef idx="minor">
+            <a:schemeClr val="lt1"/>
+          </a:fontRef>
+        </p:style>
+        <p:txBody>
+          <a:bodyPr wrap="square" rtlCol="0" anchor="ctr">
+            <a:noAutofit/>
+          </a:bodyPr>
+          <a:lstStyle/>
+          <a:p>
+            <a:pPr algn="ctr"/>
+            <a:endParaRPr lang="en-IN">
+              <a:solidFill>
+                <a:schemeClr val="tx1"/>
+              </a:solidFill>
+            </a:endParaRPr>
+          </a:p>
+        </p:txBody>
+      </p:sp>
+      <p:sp>
+        <p:nvSpPr>
+          <p:cNvPr id="8" name="Oval 7">
+            <a:extLst>
+              <a:ext uri="{FF2B5EF4-FFF2-40B4-BE49-F238E27FC236}">
+                <a16:creationId xmlns:a16="http://schemas.microsoft.com/office/drawing/2014/main" id="{B448E0E3-14DE-4BDF-8127-E194DBC3C114}"/>
+              </a:ext>
+            </a:extLst>
+          </p:cNvPr>
+          <p:cNvSpPr/>
+          <p:nvPr/>
+        </p:nvSpPr>
+        <p:spPr>
+          <a:xfrm>
+            <a:off x="3741420" y="2598420"/>
+            <a:ext cx="1661160" cy="1661160"/>
+          </a:xfrm>
+          <a:prstGeom prst="ellipse">
+            <a:avLst/>
+          </a:prstGeom>
+          <a:solidFill>
+            <a:schemeClr val="bg1"/>
+          </a:solidFill>
+          <a:ln w="254000">
+            <a:solidFill>
+              <a:srgbClr val="FFFFFF">
+                <a:alpha val="50196"/>
+              </a:srgbClr>
+            </a:solidFill>
+          </a:ln>
+        </p:spPr>
+        <p:style>
+          <a:lnRef idx="2">
+            <a:schemeClr val="accent1">
+              <a:shade val="50000"/>
+            </a:schemeClr>
+          </a:lnRef>
+          <a:fillRef idx="1">
+            <a:schemeClr val="accent1"/>
+          </a:fillRef>
+          <a:effectRef idx="0">
+            <a:schemeClr val="accent1"/>
+          </a:effectRef>
+          <a:fontRef idx="minor">
+            <a:schemeClr val="lt1"/>
+          </a:fontRef>
+        </p:style>
+        <p:txBody>
+          <a:bodyPr rtlCol="0" anchor="ctr"/>
+          <a:lstStyle/>
+          <a:p>
+            <a:pPr algn="ctr"/>
+            <a:endParaRPr lang="en-IN"/>
+          </a:p>
+        </p:txBody>
+      </p:sp>
+      <p:grpSp>
+        <p:nvGrpSpPr>
+          <p:cNvPr id="15" name="Group 14">
+            <a:extLst>
+              <a:ext uri="{FF2B5EF4-FFF2-40B4-BE49-F238E27FC236}">
+                <a16:creationId xmlns:a16="http://schemas.microsoft.com/office/drawing/2014/main" id="{F309C236-CAAB-4873-A3E4-4857862B0035}"/>
+              </a:ext>
+            </a:extLst>
+          </p:cNvPr>
+          <p:cNvGrpSpPr/>
+          <p:nvPr/>
+        </p:nvGrpSpPr>
+        <p:grpSpPr>
+          <a:xfrm>
+            <a:off x="8249484" y="1133856"/>
+            <a:ext cx="4590288" cy="4590288"/>
+            <a:chOff x="7569778" y="1854858"/>
+            <a:chExt cx="4590288" cy="4590288"/>
+          </a:xfrm>
+        </p:grpSpPr>
+        <p:sp>
+          <p:nvSpPr>
+            <p:cNvPr id="18" name="Circle: Hollow 17">
+              <a:extLst>
+                <a:ext uri="{FF2B5EF4-FFF2-40B4-BE49-F238E27FC236}">
+                  <a16:creationId xmlns:a16="http://schemas.microsoft.com/office/drawing/2014/main" id="{905502AC-2C95-493E-ABD8-7A5C23B0AB55}"/>
+                </a:ext>
+              </a:extLst>
+            </p:cNvPr>
+            <p:cNvSpPr/>
+            <p:nvPr/>
+          </p:nvSpPr>
+          <p:spPr>
+            <a:xfrm>
+              <a:off x="7569778" y="1854858"/>
+              <a:ext cx="4590288" cy="4590288"/>
+            </a:xfrm>
+            <a:prstGeom prst="donut">
+              <a:avLst>
+                <a:gd name="adj" fmla="val 3878"/>
+              </a:avLst>
+            </a:prstGeom>
+            <a:solidFill>
+              <a:schemeClr val="bg1"/>
+            </a:solidFill>
+            <a:ln>
+              <a:noFill/>
+            </a:ln>
+          </p:spPr>
+          <p:style>
+            <a:lnRef idx="2">
+              <a:schemeClr val="accent1">
+                <a:shade val="50000"/>
+              </a:schemeClr>
+            </a:lnRef>
+            <a:fillRef idx="1">
+              <a:schemeClr val="accent1"/>
+            </a:fillRef>
+            <a:effectRef idx="0">
+              <a:schemeClr val="accent1"/>
+            </a:effectRef>
+            <a:fontRef idx="minor">
+              <a:schemeClr val="lt1"/>
+            </a:fontRef>
+          </p:style>
+          <p:txBody>
+            <a:bodyPr rtlCol="0" anchor="ctr"/>
+            <a:lstStyle/>
+            <a:p>
+              <a:pPr algn="ctr"/>
+              <a:endParaRPr lang="en-IN">
+                <a:solidFill>
+                  <a:schemeClr val="tx1"/>
+                </a:solidFill>
+              </a:endParaRPr>
+            </a:p>
+          </p:txBody>
+        </p:sp>
+        <p:sp>
+          <p:nvSpPr>
+            <p:cNvPr id="19" name="Freeform: Shape 18">
+              <a:extLst>
+                <a:ext uri="{FF2B5EF4-FFF2-40B4-BE49-F238E27FC236}">
+                  <a16:creationId xmlns:a16="http://schemas.microsoft.com/office/drawing/2014/main" id="{EC397DD4-E1BB-4644-B9D4-DE223BCA64E3}"/>
+                </a:ext>
+              </a:extLst>
+            </p:cNvPr>
+            <p:cNvSpPr/>
+            <p:nvPr/>
+          </p:nvSpPr>
+          <p:spPr>
+            <a:xfrm rot="2700000">
+              <a:off x="7871529" y="2156610"/>
+              <a:ext cx="3986784" cy="3986784"/>
+            </a:xfrm>
+            <a:custGeom>
+              <a:avLst/>
+              <a:gdLst>
+                <a:gd name="connsiteX0" fmla="*/ 2449985 w 3986784"/>
+                <a:gd name="connsiteY0" fmla="*/ 3250231 h 3986784"/>
+                <a:gd name="connsiteX1" fmla="*/ 3254974 w 3986784"/>
+                <a:gd name="connsiteY1" fmla="*/ 3250230 h 3986784"/>
+                <a:gd name="connsiteX2" fmla="*/ 3254974 w 3986784"/>
+                <a:gd name="connsiteY2" fmla="*/ 2445242 h 3986784"/>
+                <a:gd name="connsiteX3" fmla="*/ 3105745 w 3986784"/>
+                <a:gd name="connsiteY3" fmla="*/ 2594471 h 3986784"/>
+                <a:gd name="connsiteX4" fmla="*/ 3105745 w 3986784"/>
+                <a:gd name="connsiteY4" fmla="*/ 3087912 h 3986784"/>
+                <a:gd name="connsiteX5" fmla="*/ 2612303 w 3986784"/>
+                <a:gd name="connsiteY5" fmla="*/ 3087913 h 3986784"/>
+                <a:gd name="connsiteX6" fmla="*/ 2459089 w 3986784"/>
+                <a:gd name="connsiteY6" fmla="*/ 776373 h 3986784"/>
+                <a:gd name="connsiteX7" fmla="*/ 2608319 w 3986784"/>
+                <a:gd name="connsiteY7" fmla="*/ 925602 h 3986784"/>
+                <a:gd name="connsiteX8" fmla="*/ 3101760 w 3986784"/>
+                <a:gd name="connsiteY8" fmla="*/ 925603 h 3986784"/>
+                <a:gd name="connsiteX9" fmla="*/ 3101760 w 3986784"/>
+                <a:gd name="connsiteY9" fmla="*/ 1419044 h 3986784"/>
+                <a:gd name="connsiteX10" fmla="*/ 3264079 w 3986784"/>
+                <a:gd name="connsiteY10" fmla="*/ 1581362 h 3986784"/>
+                <a:gd name="connsiteX11" fmla="*/ 3264078 w 3986784"/>
+                <a:gd name="connsiteY11" fmla="*/ 776374 h 3986784"/>
+                <a:gd name="connsiteX12" fmla="*/ 788122 w 3986784"/>
+                <a:gd name="connsiteY12" fmla="*/ 2419533 h 3986784"/>
+                <a:gd name="connsiteX13" fmla="*/ 788122 w 3986784"/>
+                <a:gd name="connsiteY13" fmla="*/ 3224522 h 3986784"/>
+                <a:gd name="connsiteX14" fmla="*/ 1593111 w 3986784"/>
+                <a:gd name="connsiteY14" fmla="*/ 3224522 h 3986784"/>
+                <a:gd name="connsiteX15" fmla="*/ 1443882 w 3986784"/>
+                <a:gd name="connsiteY15" fmla="*/ 3075293 h 3986784"/>
+                <a:gd name="connsiteX16" fmla="*/ 950440 w 3986784"/>
+                <a:gd name="connsiteY16" fmla="*/ 3075293 h 3986784"/>
+                <a:gd name="connsiteX17" fmla="*/ 950440 w 3986784"/>
+                <a:gd name="connsiteY17" fmla="*/ 2581851 h 3986784"/>
+                <a:gd name="connsiteX18" fmla="*/ 812742 w 3986784"/>
+                <a:gd name="connsiteY18" fmla="*/ 812742 h 3986784"/>
+                <a:gd name="connsiteX19" fmla="*/ 812742 w 3986784"/>
+                <a:gd name="connsiteY19" fmla="*/ 1617731 h 3986784"/>
+                <a:gd name="connsiteX20" fmla="*/ 961971 w 3986784"/>
+                <a:gd name="connsiteY20" fmla="*/ 1468502 h 3986784"/>
+                <a:gd name="connsiteX21" fmla="*/ 961971 w 3986784"/>
+                <a:gd name="connsiteY21" fmla="*/ 975060 h 3986784"/>
+                <a:gd name="connsiteX22" fmla="*/ 1455413 w 3986784"/>
+                <a:gd name="connsiteY22" fmla="*/ 975060 h 3986784"/>
+                <a:gd name="connsiteX23" fmla="*/ 1617731 w 3986784"/>
+                <a:gd name="connsiteY23" fmla="*/ 812742 h 3986784"/>
+                <a:gd name="connsiteX24" fmla="*/ 583851 w 3986784"/>
+                <a:gd name="connsiteY24" fmla="*/ 583851 h 3986784"/>
+                <a:gd name="connsiteX25" fmla="*/ 3402933 w 3986784"/>
+                <a:gd name="connsiteY25" fmla="*/ 583851 h 3986784"/>
+                <a:gd name="connsiteX26" fmla="*/ 3402933 w 3986784"/>
+                <a:gd name="connsiteY26" fmla="*/ 3402933 h 3986784"/>
+                <a:gd name="connsiteX27" fmla="*/ 583851 w 3986784"/>
+                <a:gd name="connsiteY27" fmla="*/ 3402933 h 3986784"/>
+                <a:gd name="connsiteX28" fmla="*/ 583851 w 3986784"/>
+                <a:gd name="connsiteY28" fmla="*/ 583851 h 3986784"/>
+              </a:gdLst>
+              <a:ahLst/>
+              <a:cxnLst>
+                <a:cxn ang="0">
+                  <a:pos x="connsiteX0" y="connsiteY0"/>
+                </a:cxn>
+                <a:cxn ang="0">
+                  <a:pos x="connsiteX1" y="connsiteY1"/>
+                </a:cxn>
+                <a:cxn ang="0">
+                  <a:pos x="connsiteX2" y="connsiteY2"/>
+                </a:cxn>
+                <a:cxn ang="0">
+                  <a:pos x="connsiteX3" y="connsiteY3"/>
+                </a:cxn>
+                <a:cxn ang="0">
+                  <a:pos x="connsiteX4" y="connsiteY4"/>
+                </a:cxn>
+                <a:cxn ang="0">
+                  <a:pos x="connsiteX5" y="connsiteY5"/>
+                </a:cxn>
+                <a:cxn ang="0">
+                  <a:pos x="connsiteX6" y="connsiteY6"/>
+                </a:cxn>
+                <a:cxn ang="0">
+                  <a:pos x="connsiteX7" y="connsiteY7"/>
+                </a:cxn>
+                <a:cxn ang="0">
+                  <a:pos x="connsiteX8" y="connsiteY8"/>
+                </a:cxn>
+                <a:cxn ang="0">
+                  <a:pos x="connsiteX9" y="connsiteY9"/>
+                </a:cxn>
+                <a:cxn ang="0">
+                  <a:pos x="connsiteX10" y="connsiteY10"/>
+                </a:cxn>
+                <a:cxn ang="0">
+                  <a:pos x="connsiteX11" y="connsiteY11"/>
+                </a:cxn>
+                <a:cxn ang="0">
+                  <a:pos x="connsiteX12" y="connsiteY12"/>
+                </a:cxn>
+                <a:cxn ang="0">
+                  <a:pos x="connsiteX13" y="connsiteY13"/>
+                </a:cxn>
+                <a:cxn ang="0">
+                  <a:pos x="connsiteX14" y="connsiteY14"/>
+                </a:cxn>
+                <a:cxn ang="0">
+                  <a:pos x="connsiteX15" y="connsiteY15"/>
+                </a:cxn>
+                <a:cxn ang="0">
+                  <a:pos x="connsiteX16" y="connsiteY16"/>
+                </a:cxn>
+                <a:cxn ang="0">
+                  <a:pos x="connsiteX17" y="connsiteY17"/>
+                </a:cxn>
+                <a:cxn ang="0">
+                  <a:pos x="connsiteX18" y="connsiteY18"/>
+                </a:cxn>
+                <a:cxn ang="0">
+                  <a:pos x="connsiteX19" y="connsiteY19"/>
+                </a:cxn>
+                <a:cxn ang="0">
+                  <a:pos x="connsiteX20" y="connsiteY20"/>
+                </a:cxn>
+                <a:cxn ang="0">
+                  <a:pos x="connsiteX21" y="connsiteY21"/>
+                </a:cxn>
+                <a:cxn ang="0">
+                  <a:pos x="connsiteX22" y="connsiteY22"/>
+                </a:cxn>
+                <a:cxn ang="0">
+                  <a:pos x="connsiteX23" y="connsiteY23"/>
+                </a:cxn>
+                <a:cxn ang="0">
+                  <a:pos x="connsiteX24" y="connsiteY24"/>
+                </a:cxn>
+                <a:cxn ang="0">
+                  <a:pos x="connsiteX25" y="connsiteY25"/>
+                </a:cxn>
+                <a:cxn ang="0">
+                  <a:pos x="connsiteX26" y="connsiteY26"/>
+                </a:cxn>
+                <a:cxn ang="0">
+                  <a:pos x="connsiteX27" y="connsiteY27"/>
+                </a:cxn>
+                <a:cxn ang="0">
+                  <a:pos x="connsiteX28" y="connsiteY28"/>
+                </a:cxn>
+              </a:cxnLst>
+              <a:rect l="l" t="t" r="r" b="b"/>
+              <a:pathLst>
+                <a:path w="3986784" h="3986784">
+                  <a:moveTo>
+                    <a:pt x="2449985" y="3250231"/>
+                  </a:moveTo>
+                  <a:lnTo>
+                    <a:pt x="3254974" y="3250230"/>
+                  </a:lnTo>
+                  <a:lnTo>
+                    <a:pt x="3254974" y="2445242"/>
+                  </a:lnTo>
+                  <a:lnTo>
+                    <a:pt x="3105745" y="2594471"/>
+                  </a:lnTo>
+                  <a:lnTo>
+                    <a:pt x="3105745" y="3087912"/>
+                  </a:lnTo>
+                  <a:lnTo>
+                    <a:pt x="2612303" y="3087913"/>
+                  </a:lnTo>
+                  <a:close/>
+                  <a:moveTo>
+                    <a:pt x="2459089" y="776373"/>
+                  </a:moveTo>
+                  <a:lnTo>
+                    <a:pt x="2608319" y="925602"/>
+                  </a:lnTo>
+                  <a:lnTo>
+                    <a:pt x="3101760" y="925603"/>
+                  </a:lnTo>
+                  <a:lnTo>
+                    <a:pt x="3101760" y="1419044"/>
+                  </a:lnTo>
+                  <a:lnTo>
+                    <a:pt x="3264079" y="1581362"/>
+                  </a:lnTo>
+                  <a:lnTo>
+                    <a:pt x="3264078" y="776374"/>
+                  </a:lnTo>
+                  <a:close/>
+                  <a:moveTo>
+                    <a:pt x="788122" y="2419533"/>
+                  </a:moveTo>
+                  <a:lnTo>
+                    <a:pt x="788122" y="3224522"/>
+                  </a:lnTo>
+                  <a:lnTo>
+                    <a:pt x="1593111" y="3224522"/>
+                  </a:lnTo>
+                  <a:lnTo>
+                    <a:pt x="1443882" y="3075293"/>
+                  </a:lnTo>
+                  <a:lnTo>
+                    <a:pt x="950440" y="3075293"/>
+                  </a:lnTo>
+                  <a:lnTo>
+                    <a:pt x="950440" y="2581851"/>
+                  </a:lnTo>
+                  <a:close/>
+                  <a:moveTo>
+                    <a:pt x="812742" y="812742"/>
+                  </a:moveTo>
+                  <a:lnTo>
+                    <a:pt x="812742" y="1617731"/>
+                  </a:lnTo>
+                  <a:lnTo>
+                    <a:pt x="961971" y="1468502"/>
+                  </a:lnTo>
+                  <a:lnTo>
+                    <a:pt x="961971" y="975060"/>
+                  </a:lnTo>
+                  <a:lnTo>
+                    <a:pt x="1455413" y="975060"/>
+                  </a:lnTo>
+                  <a:lnTo>
+                    <a:pt x="1617731" y="812742"/>
+                  </a:lnTo>
+                  <a:close/>
+                  <a:moveTo>
+                    <a:pt x="583851" y="583851"/>
+                  </a:moveTo>
+                  <a:cubicBezTo>
+                    <a:pt x="1362319" y="-194617"/>
+                    <a:pt x="2624465" y="-194617"/>
+                    <a:pt x="3402933" y="583851"/>
+                  </a:cubicBezTo>
+                  <a:cubicBezTo>
+                    <a:pt x="4181401" y="1362319"/>
+                    <a:pt x="4181401" y="2624465"/>
+                    <a:pt x="3402933" y="3402933"/>
+                  </a:cubicBezTo>
+                  <a:cubicBezTo>
+                    <a:pt x="2624465" y="4181401"/>
+                    <a:pt x="1362319" y="4181401"/>
+                    <a:pt x="583851" y="3402933"/>
+                  </a:cubicBezTo>
+                  <a:cubicBezTo>
+                    <a:pt x="-194617" y="2624465"/>
+                    <a:pt x="-194617" y="1362319"/>
+                    <a:pt x="583851" y="583851"/>
+                  </a:cubicBezTo>
+                  <a:close/>
+                </a:path>
+              </a:pathLst>
+            </a:custGeom>
+            <a:solidFill>
+              <a:schemeClr val="bg1"/>
+            </a:solidFill>
+            <a:ln>
+              <a:noFill/>
+            </a:ln>
+          </p:spPr>
+          <p:style>
+            <a:lnRef idx="2">
+              <a:schemeClr val="accent1">
+                <a:shade val="50000"/>
+              </a:schemeClr>
+            </a:lnRef>
+            <a:fillRef idx="1">
+              <a:schemeClr val="accent1"/>
+            </a:fillRef>
+            <a:effectRef idx="0">
+              <a:schemeClr val="accent1"/>
+            </a:effectRef>
+            <a:fontRef idx="minor">
+              <a:schemeClr val="lt1"/>
+            </a:fontRef>
+          </p:style>
+          <p:txBody>
+            <a:bodyPr wrap="square" rtlCol="0" anchor="ctr">
+              <a:noAutofit/>
+            </a:bodyPr>
+            <a:lstStyle/>
+            <a:p>
+              <a:pPr algn="ctr"/>
+              <a:endParaRPr lang="en-IN">
+                <a:solidFill>
+                  <a:schemeClr val="tx1"/>
+                </a:solidFill>
+              </a:endParaRPr>
+            </a:p>
+          </p:txBody>
+        </p:sp>
+      </p:grpSp>
+      <p:cxnSp>
+        <p:nvCxnSpPr>
+          <p:cNvPr id="28" name="Straight Connector 27">
+            <a:extLst>
+              <a:ext uri="{FF2B5EF4-FFF2-40B4-BE49-F238E27FC236}">
+                <a16:creationId xmlns:a16="http://schemas.microsoft.com/office/drawing/2014/main" id="{A8CDF03B-7684-4F8C-B314-5B341086EF9E}"/>
+              </a:ext>
+            </a:extLst>
+          </p:cNvPr>
+          <p:cNvCxnSpPr/>
+          <p:nvPr/>
+        </p:nvCxnSpPr>
+        <p:spPr>
+          <a:xfrm>
+            <a:off x="1752916" y="2138785"/>
+            <a:ext cx="5406667" cy="0"/>
+          </a:xfrm>
+          <a:prstGeom prst="line">
+            <a:avLst/>
+          </a:prstGeom>
+        </p:spPr>
+        <p:style>
+          <a:lnRef idx="1">
+            <a:schemeClr val="accent1"/>
+          </a:lnRef>
+          <a:fillRef idx="0">
+            <a:schemeClr val="accent1"/>
+          </a:fillRef>
+          <a:effectRef idx="0">
+            <a:schemeClr val="accent1"/>
+          </a:effectRef>
+          <a:fontRef idx="minor">
+            <a:schemeClr val="tx1"/>
+          </a:fontRef>
+        </p:style>
+      </p:cxnSp>
+      <p:sp>
+        <p:nvSpPr>
+          <p:cNvPr id="3" name="Arc 2">
+            <a:extLst>
+              <a:ext uri="{FF2B5EF4-FFF2-40B4-BE49-F238E27FC236}">
+                <a16:creationId xmlns:a16="http://schemas.microsoft.com/office/drawing/2014/main" id="{F1DE6C16-66BA-4944-BAFA-DE19BAB319DB}"/>
+              </a:ext>
+            </a:extLst>
+          </p:cNvPr>
+          <p:cNvSpPr/>
+          <p:nvPr/>
+        </p:nvSpPr>
+        <p:spPr>
+          <a:xfrm>
+            <a:off x="2377660" y="1232555"/>
+            <a:ext cx="4392890" cy="4392890"/>
+          </a:xfrm>
+          <a:prstGeom prst="arc">
+            <a:avLst>
+              <a:gd name="adj1" fmla="val 12977755"/>
+              <a:gd name="adj2" fmla="val 19474705"/>
+            </a:avLst>
+          </a:prstGeom>
+          <a:ln w="190500" cap="rnd">
+            <a:solidFill>
+              <a:schemeClr val="bg1"/>
+            </a:solidFill>
+          </a:ln>
+          <a:effectLst>
+            <a:glow rad="228600">
+              <a:schemeClr val="bg1">
+                <a:alpha val="40000"/>
+              </a:schemeClr>
+            </a:glow>
+          </a:effectLst>
+        </p:spPr>
+        <p:style>
+          <a:lnRef idx="1">
+            <a:schemeClr val="accent1"/>
+          </a:lnRef>
+          <a:fillRef idx="0">
+            <a:schemeClr val="accent1"/>
+          </a:fillRef>
+          <a:effectRef idx="0">
+            <a:schemeClr val="accent1"/>
+          </a:effectRef>
+          <a:fontRef idx="minor">
+            <a:schemeClr val="tx1"/>
+          </a:fontRef>
+        </p:style>
+        <p:txBody>
+          <a:bodyPr rtlCol="0" anchor="ctr"/>
+          <a:lstStyle/>
+          <a:p>
+            <a:pPr algn="ctr"/>
+            <a:endParaRPr lang="en-IN"/>
+          </a:p>
+        </p:txBody>
+      </p:sp>
+      <p:sp>
+        <p:nvSpPr>
+          <p:cNvPr id="16" name="Arc 15">
+            <a:extLst>
+              <a:ext uri="{FF2B5EF4-FFF2-40B4-BE49-F238E27FC236}">
+                <a16:creationId xmlns:a16="http://schemas.microsoft.com/office/drawing/2014/main" id="{5C7BA855-062D-41FB-B829-A92492BC8D43}"/>
+              </a:ext>
+            </a:extLst>
+          </p:cNvPr>
+          <p:cNvSpPr/>
+          <p:nvPr/>
+        </p:nvSpPr>
+        <p:spPr>
+          <a:xfrm>
+            <a:off x="1590103" y="437864"/>
+            <a:ext cx="5982272" cy="5982272"/>
+          </a:xfrm>
+          <a:prstGeom prst="arc">
+            <a:avLst>
+              <a:gd name="adj1" fmla="val 12977755"/>
+              <a:gd name="adj2" fmla="val 12900976"/>
+            </a:avLst>
+          </a:prstGeom>
+          <a:ln w="190500" cap="rnd">
+            <a:solidFill>
+              <a:schemeClr val="bg1"/>
+            </a:solidFill>
+          </a:ln>
+          <a:effectLst>
+            <a:glow rad="228600">
+              <a:schemeClr val="bg1">
+                <a:alpha val="40000"/>
+              </a:schemeClr>
+            </a:glow>
+          </a:effectLst>
+        </p:spPr>
+        <p:style>
+          <a:lnRef idx="1">
+            <a:schemeClr val="accent1"/>
+          </a:lnRef>
+          <a:fillRef idx="0">
+            <a:schemeClr val="accent1"/>
+          </a:fillRef>
+          <a:effectRef idx="0">
+            <a:schemeClr val="accent1"/>
+          </a:effectRef>
+          <a:fontRef idx="minor">
+            <a:schemeClr val="tx1"/>
+          </a:fontRef>
+        </p:style>
+        <p:txBody>
+          <a:bodyPr rtlCol="0" anchor="ctr"/>
+          <a:lstStyle/>
+          <a:p>
+            <a:pPr algn="ctr"/>
+            <a:endParaRPr lang="en-IN"/>
+          </a:p>
+        </p:txBody>
+      </p:sp>
+      <p:sp>
+        <p:nvSpPr>
+          <p:cNvPr id="12" name="Oval 11">
+            <a:extLst>
+              <a:ext uri="{FF2B5EF4-FFF2-40B4-BE49-F238E27FC236}">
+                <a16:creationId xmlns:a16="http://schemas.microsoft.com/office/drawing/2014/main" id="{FB0565F6-8DBF-4B85-88AD-5148B2CA8C2F}"/>
+              </a:ext>
+            </a:extLst>
+          </p:cNvPr>
+          <p:cNvSpPr/>
+          <p:nvPr/>
+        </p:nvSpPr>
+        <p:spPr>
+          <a:xfrm>
+            <a:off x="6718377" y="412853"/>
+            <a:ext cx="1442005" cy="1442005"/>
+          </a:xfrm>
+          <a:prstGeom prst="ellipse">
+            <a:avLst/>
+          </a:prstGeom>
+          <a:gradFill flip="none" rotWithShape="1">
+            <a:gsLst>
+              <a:gs pos="0">
+                <a:schemeClr val="tx1">
+                  <a:lumMod val="75000"/>
+                  <a:lumOff val="25000"/>
+                </a:schemeClr>
+              </a:gs>
+              <a:gs pos="62000">
+                <a:srgbClr val="A2A2A2"/>
+              </a:gs>
+              <a:gs pos="100000">
+                <a:schemeClr val="bg1"/>
+              </a:gs>
+            </a:gsLst>
+            <a:lin ang="13500000" scaled="1"/>
+            <a:tileRect/>
+          </a:gradFill>
+          <a:ln>
+            <a:noFill/>
+          </a:ln>
+          <a:scene3d>
+            <a:camera prst="orthographicFront"/>
+            <a:lightRig rig="threePt" dir="t">
+              <a:rot lat="0" lon="0" rev="8400000"/>
+            </a:lightRig>
+          </a:scene3d>
+          <a:sp3d>
+            <a:bevelT w="127000" h="171450" prst="coolSlant"/>
+          </a:sp3d>
+        </p:spPr>
+        <p:style>
+          <a:lnRef idx="2">
+            <a:schemeClr val="accent1">
+              <a:shade val="50000"/>
+            </a:schemeClr>
+          </a:lnRef>
+          <a:fillRef idx="1">
+            <a:schemeClr val="accent1"/>
+          </a:fillRef>
+          <a:effectRef idx="0">
+            <a:schemeClr val="accent1"/>
+          </a:effectRef>
+          <a:fontRef idx="minor">
+            <a:schemeClr val="lt1"/>
+          </a:fontRef>
+        </p:style>
+        <p:txBody>
+          <a:bodyPr rtlCol="0" anchor="ctr"/>
+          <a:lstStyle/>
+          <a:p>
+            <a:pPr algn="ctr"/>
+            <a:endParaRPr lang="en-IN" dirty="0"/>
+          </a:p>
+        </p:txBody>
+      </p:sp>
+    </p:spTree>
+    <p:extLst>
+      <p:ext uri="{BB962C8B-B14F-4D97-AF65-F5344CB8AC3E}">
+        <p14:creationId xmlns:p14="http://schemas.microsoft.com/office/powerpoint/2010/main" val="803234450"/>
+      </p:ext>
+    </p:extLst>
+  </p:cSld>
+  <p:clrMapOvr>
+    <a:masterClrMapping/>
+  </p:clrMapOvr>
+</p:sld>
+</file>
+
+<file path=ppt/slides/slide7.xml><?xml version="1.0" encoding="utf-8"?>
 <p:sld xmlns:a="http://schemas.openxmlformats.org/drawingml/2006/main" xmlns:r="http://schemas.openxmlformats.org/officeDocument/2006/relationships" xmlns:p="http://schemas.openxmlformats.org/presentationml/2006/main">
   <p:cSld>
     <p:bg>
@@ -3361,6 +5356,294 @@
     <p:extLst>
       <p:ext uri="{BB962C8B-B14F-4D97-AF65-F5344CB8AC3E}">
         <p14:creationId xmlns:p14="http://schemas.microsoft.com/office/powerpoint/2010/main" val="1484257562"/>
+      </p:ext>
+    </p:extLst>
+  </p:cSld>
+  <p:clrMapOvr>
+    <a:masterClrMapping/>
+  </p:clrMapOvr>
+</p:sld>
+</file>
+
+<file path=ppt/slides/slide8.xml><?xml version="1.0" encoding="utf-8"?>
+<p:sld xmlns:a="http://schemas.openxmlformats.org/drawingml/2006/main" xmlns:r="http://schemas.openxmlformats.org/officeDocument/2006/relationships" xmlns:p="http://schemas.openxmlformats.org/presentationml/2006/main">
+  <p:cSld>
+    <p:bg>
+      <p:bgPr>
+        <a:solidFill>
+          <a:schemeClr val="tx1"/>
+        </a:solidFill>
+        <a:effectLst/>
+      </p:bgPr>
+    </p:bg>
+    <p:spTree>
+      <p:nvGrpSpPr>
+        <p:cNvPr id="1" name=""/>
+        <p:cNvGrpSpPr/>
+        <p:nvPr/>
+      </p:nvGrpSpPr>
+      <p:grpSpPr>
+        <a:xfrm>
+          <a:off x="0" y="0"/>
+          <a:ext cx="0" cy="0"/>
+          <a:chOff x="0" y="0"/>
+          <a:chExt cx="0" cy="0"/>
+        </a:xfrm>
+      </p:grpSpPr>
+      <p:sp>
+        <p:nvSpPr>
+          <p:cNvPr id="2" name="Oval 1">
+            <a:extLst>
+              <a:ext uri="{FF2B5EF4-FFF2-40B4-BE49-F238E27FC236}">
+                <a16:creationId xmlns:a16="http://schemas.microsoft.com/office/drawing/2014/main" id="{BB9FA810-2B32-4230-AFB2-CDCBF6192A9E}"/>
+              </a:ext>
+            </a:extLst>
+          </p:cNvPr>
+          <p:cNvSpPr/>
+          <p:nvPr/>
+        </p:nvSpPr>
+        <p:spPr>
+          <a:xfrm>
+            <a:off x="3044952" y="1901952"/>
+            <a:ext cx="3054096" cy="3054096"/>
+          </a:xfrm>
+          <a:prstGeom prst="ellipse">
+            <a:avLst/>
+          </a:prstGeom>
+          <a:gradFill flip="none" rotWithShape="1">
+            <a:gsLst>
+              <a:gs pos="27000">
+                <a:srgbClr val="F7FAFC"/>
+              </a:gs>
+              <a:gs pos="0">
+                <a:schemeClr val="accent1">
+                  <a:lumMod val="5000"/>
+                  <a:lumOff val="95000"/>
+                </a:schemeClr>
+              </a:gs>
+              <a:gs pos="70000">
+                <a:schemeClr val="bg1">
+                  <a:alpha val="0"/>
+                </a:schemeClr>
+              </a:gs>
+            </a:gsLst>
+            <a:path path="circle">
+              <a:fillToRect l="50000" t="50000" r="50000" b="50000"/>
+            </a:path>
+            <a:tileRect/>
+          </a:gradFill>
+          <a:ln>
+            <a:noFill/>
+          </a:ln>
+        </p:spPr>
+        <p:style>
+          <a:lnRef idx="2">
+            <a:schemeClr val="accent1">
+              <a:shade val="50000"/>
+            </a:schemeClr>
+          </a:lnRef>
+          <a:fillRef idx="1">
+            <a:schemeClr val="accent1"/>
+          </a:fillRef>
+          <a:effectRef idx="0">
+            <a:schemeClr val="accent1"/>
+          </a:effectRef>
+          <a:fontRef idx="minor">
+            <a:schemeClr val="lt1"/>
+          </a:fontRef>
+        </p:style>
+        <p:txBody>
+          <a:bodyPr rtlCol="0" anchor="ctr"/>
+          <a:lstStyle/>
+          <a:p>
+            <a:pPr algn="ctr"/>
+            <a:endParaRPr lang="en-IN" dirty="0"/>
+          </a:p>
+        </p:txBody>
+      </p:sp>
+      <p:sp>
+        <p:nvSpPr>
+          <p:cNvPr id="3" name="Oval 2">
+            <a:extLst>
+              <a:ext uri="{FF2B5EF4-FFF2-40B4-BE49-F238E27FC236}">
+                <a16:creationId xmlns:a16="http://schemas.microsoft.com/office/drawing/2014/main" id="{1FAA4FC1-4D62-4338-8A62-D903A26423EE}"/>
+              </a:ext>
+            </a:extLst>
+          </p:cNvPr>
+          <p:cNvSpPr/>
+          <p:nvPr/>
+        </p:nvSpPr>
+        <p:spPr>
+          <a:xfrm>
+            <a:off x="3850997" y="2707997"/>
+            <a:ext cx="1442005" cy="1442005"/>
+          </a:xfrm>
+          <a:prstGeom prst="ellipse">
+            <a:avLst/>
+          </a:prstGeom>
+          <a:gradFill flip="none" rotWithShape="1">
+            <a:gsLst>
+              <a:gs pos="0">
+                <a:schemeClr val="tx1">
+                  <a:lumMod val="75000"/>
+                  <a:lumOff val="25000"/>
+                </a:schemeClr>
+              </a:gs>
+              <a:gs pos="62000">
+                <a:srgbClr val="A2A2A2"/>
+              </a:gs>
+              <a:gs pos="100000">
+                <a:schemeClr val="bg1"/>
+              </a:gs>
+            </a:gsLst>
+            <a:lin ang="13500000" scaled="1"/>
+            <a:tileRect/>
+          </a:gradFill>
+          <a:ln>
+            <a:noFill/>
+          </a:ln>
+          <a:scene3d>
+            <a:camera prst="orthographicFront"/>
+            <a:lightRig rig="threePt" dir="t">
+              <a:rot lat="0" lon="0" rev="8400000"/>
+            </a:lightRig>
+          </a:scene3d>
+          <a:sp3d>
+            <a:bevelT w="127000" h="171450" prst="coolSlant"/>
+          </a:sp3d>
+        </p:spPr>
+        <p:style>
+          <a:lnRef idx="2">
+            <a:schemeClr val="accent1">
+              <a:shade val="50000"/>
+            </a:schemeClr>
+          </a:lnRef>
+          <a:fillRef idx="1">
+            <a:schemeClr val="accent1"/>
+          </a:fillRef>
+          <a:effectRef idx="0">
+            <a:schemeClr val="accent1"/>
+          </a:effectRef>
+          <a:fontRef idx="minor">
+            <a:schemeClr val="lt1"/>
+          </a:fontRef>
+        </p:style>
+        <p:txBody>
+          <a:bodyPr rtlCol="0" anchor="ctr"/>
+          <a:lstStyle/>
+          <a:p>
+            <a:pPr algn="ctr"/>
+            <a:endParaRPr lang="en-IN" dirty="0"/>
+          </a:p>
+        </p:txBody>
+      </p:sp>
+    </p:spTree>
+    <p:extLst>
+      <p:ext uri="{BB962C8B-B14F-4D97-AF65-F5344CB8AC3E}">
+        <p14:creationId xmlns:p14="http://schemas.microsoft.com/office/powerpoint/2010/main" val="309953537"/>
+      </p:ext>
+    </p:extLst>
+  </p:cSld>
+  <p:clrMapOvr>
+    <a:masterClrMapping/>
+  </p:clrMapOvr>
+</p:sld>
+</file>
+
+<file path=ppt/slides/slide9.xml><?xml version="1.0" encoding="utf-8"?>
+<p:sld xmlns:a="http://schemas.openxmlformats.org/drawingml/2006/main" xmlns:r="http://schemas.openxmlformats.org/officeDocument/2006/relationships" xmlns:p="http://schemas.openxmlformats.org/presentationml/2006/main">
+  <p:cSld>
+    <p:bg>
+      <p:bgPr>
+        <a:solidFill>
+          <a:schemeClr val="bg1">
+            <a:lumMod val="85000"/>
+          </a:schemeClr>
+        </a:solidFill>
+        <a:effectLst/>
+      </p:bgPr>
+    </p:bg>
+    <p:spTree>
+      <p:nvGrpSpPr>
+        <p:cNvPr id="1" name=""/>
+        <p:cNvGrpSpPr/>
+        <p:nvPr/>
+      </p:nvGrpSpPr>
+      <p:grpSpPr>
+        <a:xfrm>
+          <a:off x="0" y="0"/>
+          <a:ext cx="0" cy="0"/>
+          <a:chOff x="0" y="0"/>
+          <a:chExt cx="0" cy="0"/>
+        </a:xfrm>
+      </p:grpSpPr>
+      <p:sp>
+        <p:nvSpPr>
+          <p:cNvPr id="4" name="Rectangle: Rounded Corners 3">
+            <a:extLst>
+              <a:ext uri="{FF2B5EF4-FFF2-40B4-BE49-F238E27FC236}">
+                <a16:creationId xmlns:a16="http://schemas.microsoft.com/office/drawing/2014/main" id="{FE6125FE-148F-4C48-AA05-7BC4E92676FA}"/>
+              </a:ext>
+            </a:extLst>
+          </p:cNvPr>
+          <p:cNvSpPr/>
+          <p:nvPr/>
+        </p:nvSpPr>
+        <p:spPr>
+          <a:xfrm>
+            <a:off x="3813049" y="2673350"/>
+            <a:ext cx="1514601" cy="1511300"/>
+          </a:xfrm>
+          <a:prstGeom prst="roundRect">
+            <a:avLst>
+              <a:gd name="adj" fmla="val 4757"/>
+            </a:avLst>
+          </a:prstGeom>
+          <a:solidFill>
+            <a:schemeClr val="bg1"/>
+          </a:solidFill>
+          <a:ln>
+            <a:solidFill>
+              <a:schemeClr val="tx1"/>
+            </a:solidFill>
+          </a:ln>
+          <a:scene3d>
+            <a:camera prst="orthographicFront"/>
+            <a:lightRig rig="threePt" dir="t"/>
+          </a:scene3d>
+          <a:sp3d prstMaterial="plastic">
+            <a:bevelT w="165100" prst="coolSlant"/>
+          </a:sp3d>
+        </p:spPr>
+        <p:style>
+          <a:lnRef idx="2">
+            <a:schemeClr val="accent1">
+              <a:shade val="50000"/>
+            </a:schemeClr>
+          </a:lnRef>
+          <a:fillRef idx="1">
+            <a:schemeClr val="accent1"/>
+          </a:fillRef>
+          <a:effectRef idx="0">
+            <a:schemeClr val="accent1"/>
+          </a:effectRef>
+          <a:fontRef idx="minor">
+            <a:schemeClr val="lt1"/>
+          </a:fontRef>
+        </p:style>
+        <p:txBody>
+          <a:bodyPr rtlCol="0" anchor="ctr"/>
+          <a:lstStyle/>
+          <a:p>
+            <a:pPr algn="ctr"/>
+            <a:endParaRPr lang="en-IN"/>
+          </a:p>
+        </p:txBody>
+      </p:sp>
+    </p:spTree>
+    <p:extLst>
+      <p:ext uri="{BB962C8B-B14F-4D97-AF65-F5344CB8AC3E}">
+        <p14:creationId xmlns:p14="http://schemas.microsoft.com/office/powerpoint/2010/main" val="2405374044"/>
       </p:ext>
     </p:extLst>
   </p:cSld>

</xml_diff>